<commit_message>
add some conten in the ppt
</commit_message>
<xml_diff>
--- a/ppt/driver2015.pptx
+++ b/ppt/driver2015.pptx
@@ -18,93 +18,123 @@
     <a:defPPr>
       <a:defRPr lang="zh-CN"/>
     </a:defPPr>
-    <a:lvl1pPr marL="0" algn="l" defTabSz="914400" rtl="0" eaLnBrk="1" latinLnBrk="0" hangingPunct="1">
-      <a:defRPr sz="1800" kern="1200">
+    <a:lvl1pPr algn="l" rtl="0" fontAlgn="base">
+      <a:spcBef>
+        <a:spcPct val="0"/>
+      </a:spcBef>
+      <a:spcAft>
+        <a:spcPct val="0"/>
+      </a:spcAft>
+      <a:defRPr kern="1200">
         <a:solidFill>
           <a:schemeClr val="tx1"/>
         </a:solidFill>
-        <a:latin typeface="+mn-lt"/>
-        <a:ea typeface="+mn-ea"/>
+        <a:latin typeface="Arial" charset="0"/>
+        <a:ea typeface="宋体" pitchFamily="2" charset="-122"/>
         <a:cs typeface="+mn-cs"/>
       </a:defRPr>
     </a:lvl1pPr>
-    <a:lvl2pPr marL="457200" algn="l" defTabSz="914400" rtl="0" eaLnBrk="1" latinLnBrk="0" hangingPunct="1">
-      <a:defRPr sz="1800" kern="1200">
+    <a:lvl2pPr marL="457200" algn="l" rtl="0" fontAlgn="base">
+      <a:spcBef>
+        <a:spcPct val="0"/>
+      </a:spcBef>
+      <a:spcAft>
+        <a:spcPct val="0"/>
+      </a:spcAft>
+      <a:defRPr kern="1200">
         <a:solidFill>
           <a:schemeClr val="tx1"/>
         </a:solidFill>
-        <a:latin typeface="+mn-lt"/>
-        <a:ea typeface="+mn-ea"/>
+        <a:latin typeface="Arial" charset="0"/>
+        <a:ea typeface="宋体" pitchFamily="2" charset="-122"/>
         <a:cs typeface="+mn-cs"/>
       </a:defRPr>
     </a:lvl2pPr>
-    <a:lvl3pPr marL="914400" algn="l" defTabSz="914400" rtl="0" eaLnBrk="1" latinLnBrk="0" hangingPunct="1">
-      <a:defRPr sz="1800" kern="1200">
+    <a:lvl3pPr marL="914400" algn="l" rtl="0" fontAlgn="base">
+      <a:spcBef>
+        <a:spcPct val="0"/>
+      </a:spcBef>
+      <a:spcAft>
+        <a:spcPct val="0"/>
+      </a:spcAft>
+      <a:defRPr kern="1200">
         <a:solidFill>
           <a:schemeClr val="tx1"/>
         </a:solidFill>
-        <a:latin typeface="+mn-lt"/>
-        <a:ea typeface="+mn-ea"/>
+        <a:latin typeface="Arial" charset="0"/>
+        <a:ea typeface="宋体" pitchFamily="2" charset="-122"/>
         <a:cs typeface="+mn-cs"/>
       </a:defRPr>
     </a:lvl3pPr>
-    <a:lvl4pPr marL="1371600" algn="l" defTabSz="914400" rtl="0" eaLnBrk="1" latinLnBrk="0" hangingPunct="1">
-      <a:defRPr sz="1800" kern="1200">
+    <a:lvl4pPr marL="1371600" algn="l" rtl="0" fontAlgn="base">
+      <a:spcBef>
+        <a:spcPct val="0"/>
+      </a:spcBef>
+      <a:spcAft>
+        <a:spcPct val="0"/>
+      </a:spcAft>
+      <a:defRPr kern="1200">
         <a:solidFill>
           <a:schemeClr val="tx1"/>
         </a:solidFill>
-        <a:latin typeface="+mn-lt"/>
-        <a:ea typeface="+mn-ea"/>
+        <a:latin typeface="Arial" charset="0"/>
+        <a:ea typeface="宋体" pitchFamily="2" charset="-122"/>
         <a:cs typeface="+mn-cs"/>
       </a:defRPr>
     </a:lvl4pPr>
-    <a:lvl5pPr marL="1828800" algn="l" defTabSz="914400" rtl="0" eaLnBrk="1" latinLnBrk="0" hangingPunct="1">
-      <a:defRPr sz="1800" kern="1200">
+    <a:lvl5pPr marL="1828800" algn="l" rtl="0" fontAlgn="base">
+      <a:spcBef>
+        <a:spcPct val="0"/>
+      </a:spcBef>
+      <a:spcAft>
+        <a:spcPct val="0"/>
+      </a:spcAft>
+      <a:defRPr kern="1200">
         <a:solidFill>
           <a:schemeClr val="tx1"/>
         </a:solidFill>
-        <a:latin typeface="+mn-lt"/>
-        <a:ea typeface="+mn-ea"/>
+        <a:latin typeface="Arial" charset="0"/>
+        <a:ea typeface="宋体" pitchFamily="2" charset="-122"/>
         <a:cs typeface="+mn-cs"/>
       </a:defRPr>
     </a:lvl5pPr>
     <a:lvl6pPr marL="2286000" algn="l" defTabSz="914400" rtl="0" eaLnBrk="1" latinLnBrk="0" hangingPunct="1">
-      <a:defRPr sz="1800" kern="1200">
+      <a:defRPr kern="1200">
         <a:solidFill>
           <a:schemeClr val="tx1"/>
         </a:solidFill>
-        <a:latin typeface="+mn-lt"/>
-        <a:ea typeface="+mn-ea"/>
+        <a:latin typeface="Arial" charset="0"/>
+        <a:ea typeface="宋体" pitchFamily="2" charset="-122"/>
         <a:cs typeface="+mn-cs"/>
       </a:defRPr>
     </a:lvl6pPr>
     <a:lvl7pPr marL="2743200" algn="l" defTabSz="914400" rtl="0" eaLnBrk="1" latinLnBrk="0" hangingPunct="1">
-      <a:defRPr sz="1800" kern="1200">
+      <a:defRPr kern="1200">
         <a:solidFill>
           <a:schemeClr val="tx1"/>
         </a:solidFill>
-        <a:latin typeface="+mn-lt"/>
-        <a:ea typeface="+mn-ea"/>
+        <a:latin typeface="Arial" charset="0"/>
+        <a:ea typeface="宋体" pitchFamily="2" charset="-122"/>
         <a:cs typeface="+mn-cs"/>
       </a:defRPr>
     </a:lvl7pPr>
     <a:lvl8pPr marL="3200400" algn="l" defTabSz="914400" rtl="0" eaLnBrk="1" latinLnBrk="0" hangingPunct="1">
-      <a:defRPr sz="1800" kern="1200">
+      <a:defRPr kern="1200">
         <a:solidFill>
           <a:schemeClr val="tx1"/>
         </a:solidFill>
-        <a:latin typeface="+mn-lt"/>
-        <a:ea typeface="+mn-ea"/>
+        <a:latin typeface="Arial" charset="0"/>
+        <a:ea typeface="宋体" pitchFamily="2" charset="-122"/>
         <a:cs typeface="+mn-cs"/>
       </a:defRPr>
     </a:lvl8pPr>
     <a:lvl9pPr marL="3657600" algn="l" defTabSz="914400" rtl="0" eaLnBrk="1" latinLnBrk="0" hangingPunct="1">
-      <a:defRPr sz="1800" kern="1200">
+      <a:defRPr kern="1200">
         <a:solidFill>
           <a:schemeClr val="tx1"/>
         </a:solidFill>
-        <a:latin typeface="+mn-lt"/>
-        <a:ea typeface="+mn-ea"/>
+        <a:latin typeface="Arial" charset="0"/>
+        <a:ea typeface="宋体" pitchFamily="2" charset="-122"/>
         <a:cs typeface="+mn-cs"/>
       </a:defRPr>
     </a:lvl9pPr>
@@ -156,11 +186,23 @@
         <p:txBody>
           <a:bodyPr vert="horz" lIns="91440" tIns="45720" rIns="91440" bIns="45720" rtlCol="0"/>
           <a:lstStyle>
-            <a:lvl1pPr algn="l">
-              <a:defRPr sz="1200"/>
-            </a:lvl1pPr>
-          </a:lstStyle>
-          <a:p>
+            <a:lvl1pPr algn="l" fontAlgn="auto">
+              <a:spcBef>
+                <a:spcPts val="0"/>
+              </a:spcBef>
+              <a:spcAft>
+                <a:spcPts val="0"/>
+              </a:spcAft>
+              <a:defRPr sz="1200">
+                <a:latin typeface="+mn-lt"/>
+                <a:ea typeface="+mn-ea"/>
+              </a:defRPr>
+            </a:lvl1pPr>
+          </a:lstStyle>
+          <a:p>
+            <a:pPr>
+              <a:defRPr/>
+            </a:pPr>
             <a:endParaRPr lang="zh-CN" altLang="en-US"/>
           </a:p>
         </p:txBody>
@@ -187,14 +229,29 @@
         <p:txBody>
           <a:bodyPr vert="horz" lIns="91440" tIns="45720" rIns="91440" bIns="45720" rtlCol="0"/>
           <a:lstStyle>
-            <a:lvl1pPr algn="r">
-              <a:defRPr sz="1200"/>
-            </a:lvl1pPr>
-          </a:lstStyle>
-          <a:p>
-            <a:fld id="{ED1C5B2D-6BAA-48B2-A28B-8DAE69696732}" type="datetimeFigureOut">
-              <a:rPr lang="zh-CN" altLang="en-US" smtClean="0"/>
-              <a:t>2015/1/16</a:t>
+            <a:lvl1pPr algn="r" fontAlgn="auto">
+              <a:spcBef>
+                <a:spcPts val="0"/>
+              </a:spcBef>
+              <a:spcAft>
+                <a:spcPts val="0"/>
+              </a:spcAft>
+              <a:defRPr sz="1200" smtClean="0">
+                <a:latin typeface="+mn-lt"/>
+                <a:ea typeface="+mn-ea"/>
+              </a:defRPr>
+            </a:lvl1pPr>
+          </a:lstStyle>
+          <a:p>
+            <a:pPr>
+              <a:defRPr/>
+            </a:pPr>
+            <a:fld id="{9F12B46C-C8A0-426E-98C1-63EAE64E6962}" type="datetimeFigureOut">
+              <a:rPr lang="zh-CN" altLang="en-US"/>
+              <a:pPr>
+                <a:defRPr/>
+              </a:pPr>
+              <a:t>2015-2-12</a:t>
             </a:fld>
             <a:endParaRPr lang="zh-CN" altLang="en-US"/>
           </a:p>
@@ -229,7 +286,8 @@
           <a:bodyPr vert="horz" lIns="91440" tIns="45720" rIns="91440" bIns="45720" rtlCol="0" anchor="ctr"/>
           <a:lstStyle/>
           <a:p>
-            <a:endParaRPr lang="zh-CN" altLang="en-US"/>
+            <a:pPr lvl="0"/>
+            <a:endParaRPr lang="zh-CN" altLang="en-US" noProof="0"/>
           </a:p>
         </p:txBody>
       </p:sp>
@@ -258,38 +316,38 @@
           <a:p>
             <a:pPr lvl="0"/>
             <a:r>
-              <a:rPr lang="zh-CN" altLang="en-US" smtClean="0"/>
+              <a:rPr lang="zh-CN" altLang="en-US" noProof="0" smtClean="0"/>
               <a:t>单击此处编辑母版文本样式</a:t>
             </a:r>
           </a:p>
           <a:p>
             <a:pPr lvl="1"/>
             <a:r>
-              <a:rPr lang="zh-CN" altLang="en-US" smtClean="0"/>
+              <a:rPr lang="zh-CN" altLang="en-US" noProof="0" smtClean="0"/>
               <a:t>第二级</a:t>
             </a:r>
           </a:p>
           <a:p>
             <a:pPr lvl="2"/>
             <a:r>
-              <a:rPr lang="zh-CN" altLang="en-US" smtClean="0"/>
+              <a:rPr lang="zh-CN" altLang="en-US" noProof="0" smtClean="0"/>
               <a:t>第三级</a:t>
             </a:r>
           </a:p>
           <a:p>
             <a:pPr lvl="3"/>
             <a:r>
-              <a:rPr lang="zh-CN" altLang="en-US" smtClean="0"/>
+              <a:rPr lang="zh-CN" altLang="en-US" noProof="0" smtClean="0"/>
               <a:t>第四级</a:t>
             </a:r>
           </a:p>
           <a:p>
             <a:pPr lvl="4"/>
             <a:r>
-              <a:rPr lang="zh-CN" altLang="en-US" smtClean="0"/>
+              <a:rPr lang="zh-CN" altLang="en-US" noProof="0" smtClean="0"/>
               <a:t>第五级</a:t>
             </a:r>
-            <a:endParaRPr lang="zh-CN" altLang="en-US"/>
+            <a:endParaRPr lang="zh-CN" altLang="en-US" noProof="0"/>
           </a:p>
         </p:txBody>
       </p:sp>
@@ -315,11 +373,23 @@
         <p:txBody>
           <a:bodyPr vert="horz" lIns="91440" tIns="45720" rIns="91440" bIns="45720" rtlCol="0" anchor="b"/>
           <a:lstStyle>
-            <a:lvl1pPr algn="l">
-              <a:defRPr sz="1200"/>
-            </a:lvl1pPr>
-          </a:lstStyle>
-          <a:p>
+            <a:lvl1pPr algn="l" fontAlgn="auto">
+              <a:spcBef>
+                <a:spcPts val="0"/>
+              </a:spcBef>
+              <a:spcAft>
+                <a:spcPts val="0"/>
+              </a:spcAft>
+              <a:defRPr sz="1200">
+                <a:latin typeface="+mn-lt"/>
+                <a:ea typeface="+mn-ea"/>
+              </a:defRPr>
+            </a:lvl1pPr>
+          </a:lstStyle>
+          <a:p>
+            <a:pPr>
+              <a:defRPr/>
+            </a:pPr>
             <a:endParaRPr lang="zh-CN" altLang="en-US"/>
           </a:p>
         </p:txBody>
@@ -346,13 +416,28 @@
         <p:txBody>
           <a:bodyPr vert="horz" lIns="91440" tIns="45720" rIns="91440" bIns="45720" rtlCol="0" anchor="b"/>
           <a:lstStyle>
-            <a:lvl1pPr algn="r">
-              <a:defRPr sz="1200"/>
-            </a:lvl1pPr>
-          </a:lstStyle>
-          <a:p>
-            <a:fld id="{95733F30-5421-48EA-B41E-64706F652777}" type="slidenum">
-              <a:rPr lang="zh-CN" altLang="en-US" smtClean="0"/>
+            <a:lvl1pPr algn="r" fontAlgn="auto">
+              <a:spcBef>
+                <a:spcPts val="0"/>
+              </a:spcBef>
+              <a:spcAft>
+                <a:spcPts val="0"/>
+              </a:spcAft>
+              <a:defRPr sz="1200" smtClean="0">
+                <a:latin typeface="+mn-lt"/>
+                <a:ea typeface="+mn-ea"/>
+              </a:defRPr>
+            </a:lvl1pPr>
+          </a:lstStyle>
+          <a:p>
+            <a:pPr>
+              <a:defRPr/>
+            </a:pPr>
+            <a:fld id="{BC2A999C-41E6-42CA-88A6-56AA2A003E5F}" type="slidenum">
+              <a:rPr lang="zh-CN" altLang="en-US"/>
+              <a:pPr>
+                <a:defRPr/>
+              </a:pPr>
               <a:t>‹#›</a:t>
             </a:fld>
             <a:endParaRPr lang="zh-CN" altLang="en-US"/>
@@ -360,15 +445,16 @@
         </p:txBody>
       </p:sp>
     </p:spTree>
-    <p:extLst>
-      <p:ext uri="{BB962C8B-B14F-4D97-AF65-F5344CB8AC3E}">
-        <p14:creationId xmlns:p14="http://schemas.microsoft.com/office/powerpoint/2010/main" val="2697955020"/>
-      </p:ext>
-    </p:extLst>
   </p:cSld>
   <p:clrMap bg1="lt1" tx1="dk1" bg2="lt2" tx2="dk2" accent1="accent1" accent2="accent2" accent3="accent3" accent4="accent4" accent5="accent5" accent6="accent6" hlink="hlink" folHlink="folHlink"/>
   <p:notesStyle>
-    <a:lvl1pPr marL="0" algn="l" defTabSz="914400" rtl="0" eaLnBrk="1" latinLnBrk="0" hangingPunct="1">
+    <a:lvl1pPr algn="l" rtl="0" fontAlgn="base">
+      <a:spcBef>
+        <a:spcPct val="30000"/>
+      </a:spcBef>
+      <a:spcAft>
+        <a:spcPct val="0"/>
+      </a:spcAft>
       <a:defRPr sz="1200" kern="1200">
         <a:solidFill>
           <a:schemeClr val="tx1"/>
@@ -378,7 +464,13 @@
         <a:cs typeface="+mn-cs"/>
       </a:defRPr>
     </a:lvl1pPr>
-    <a:lvl2pPr marL="457200" algn="l" defTabSz="914400" rtl="0" eaLnBrk="1" latinLnBrk="0" hangingPunct="1">
+    <a:lvl2pPr marL="457200" algn="l" rtl="0" fontAlgn="base">
+      <a:spcBef>
+        <a:spcPct val="30000"/>
+      </a:spcBef>
+      <a:spcAft>
+        <a:spcPct val="0"/>
+      </a:spcAft>
       <a:defRPr sz="1200" kern="1200">
         <a:solidFill>
           <a:schemeClr val="tx1"/>
@@ -388,7 +480,13 @@
         <a:cs typeface="+mn-cs"/>
       </a:defRPr>
     </a:lvl2pPr>
-    <a:lvl3pPr marL="914400" algn="l" defTabSz="914400" rtl="0" eaLnBrk="1" latinLnBrk="0" hangingPunct="1">
+    <a:lvl3pPr marL="914400" algn="l" rtl="0" fontAlgn="base">
+      <a:spcBef>
+        <a:spcPct val="30000"/>
+      </a:spcBef>
+      <a:spcAft>
+        <a:spcPct val="0"/>
+      </a:spcAft>
       <a:defRPr sz="1200" kern="1200">
         <a:solidFill>
           <a:schemeClr val="tx1"/>
@@ -398,7 +496,13 @@
         <a:cs typeface="+mn-cs"/>
       </a:defRPr>
     </a:lvl3pPr>
-    <a:lvl4pPr marL="1371600" algn="l" defTabSz="914400" rtl="0" eaLnBrk="1" latinLnBrk="0" hangingPunct="1">
+    <a:lvl4pPr marL="1371600" algn="l" rtl="0" fontAlgn="base">
+      <a:spcBef>
+        <a:spcPct val="30000"/>
+      </a:spcBef>
+      <a:spcAft>
+        <a:spcPct val="0"/>
+      </a:spcAft>
       <a:defRPr sz="1200" kern="1200">
         <a:solidFill>
           <a:schemeClr val="tx1"/>
@@ -408,7 +512,13 @@
         <a:cs typeface="+mn-cs"/>
       </a:defRPr>
     </a:lvl4pPr>
-    <a:lvl5pPr marL="1828800" algn="l" defTabSz="914400" rtl="0" eaLnBrk="1" latinLnBrk="0" hangingPunct="1">
+    <a:lvl5pPr marL="1828800" algn="l" rtl="0" fontAlgn="base">
+      <a:spcBef>
+        <a:spcPct val="30000"/>
+      </a:spcBef>
+      <a:spcAft>
+        <a:spcPct val="0"/>
+      </a:spcAft>
       <a:defRPr sz="1200" kern="1200">
         <a:solidFill>
           <a:schemeClr val="tx1"/>
@@ -481,7 +591,7 @@
       </p:grpSpPr>
       <p:sp>
         <p:nvSpPr>
-          <p:cNvPr id="2" name="幻灯片图像占位符 1"/>
+          <p:cNvPr id="16385" name="幻灯片图像占位符 1"/>
           <p:cNvSpPr>
             <a:spLocks noGrp="1" noRot="1" noChangeAspect="1"/>
           </p:cNvSpPr>
@@ -489,11 +599,21 @@
             <p:ph type="sldImg"/>
           </p:nvPr>
         </p:nvSpPr>
-        <p:spPr/>
-      </p:sp>
-      <p:sp>
-        <p:nvSpPr>
-          <p:cNvPr id="3" name="备注占位符 2"/>
+        <p:spPr bwMode="auto">
+          <a:noFill/>
+          <a:ln>
+            <a:solidFill>
+              <a:srgbClr val="000000"/>
+            </a:solidFill>
+            <a:miter lim="800000"/>
+            <a:headEnd/>
+            <a:tailEnd/>
+          </a:ln>
+        </p:spPr>
+      </p:sp>
+      <p:sp>
+        <p:nvSpPr>
+          <p:cNvPr id="16386" name="备注占位符 2"/>
           <p:cNvSpPr>
             <a:spLocks noGrp="1"/>
           </p:cNvSpPr>
@@ -501,32 +621,70 @@
             <p:ph type="body" idx="1"/>
           </p:nvPr>
         </p:nvSpPr>
-        <p:spPr/>
-        <p:txBody>
-          <a:bodyPr/>
+        <p:spPr bwMode="auto">
+          <a:noFill/>
+        </p:spPr>
+        <p:txBody>
+          <a:bodyPr wrap="square" numCol="1" anchor="t" anchorCtr="0" compatLnSpc="1">
+            <a:prstTxWarp prst="textNoShape">
+              <a:avLst/>
+            </a:prstTxWarp>
+          </a:bodyPr>
           <a:lstStyle/>
           <a:p>
-            <a:endParaRPr lang="zh-CN" altLang="en-US" dirty="0"/>
-          </a:p>
-        </p:txBody>
-      </p:sp>
-      <p:sp>
-        <p:nvSpPr>
-          <p:cNvPr id="4" name="灯片编号占位符 3"/>
-          <p:cNvSpPr>
-            <a:spLocks noGrp="1"/>
-          </p:cNvSpPr>
-          <p:nvPr>
-            <p:ph type="sldNum" sz="quarter" idx="10"/>
-          </p:nvPr>
-        </p:nvSpPr>
-        <p:spPr/>
-        <p:txBody>
-          <a:bodyPr/>
+            <a:pPr>
+              <a:spcBef>
+                <a:spcPct val="0"/>
+              </a:spcBef>
+            </a:pPr>
+            <a:endParaRPr lang="zh-CN" altLang="en-US" smtClean="0"/>
+          </a:p>
+        </p:txBody>
+      </p:sp>
+      <p:sp>
+        <p:nvSpPr>
+          <p:cNvPr id="16387" name="灯片编号占位符 3"/>
+          <p:cNvSpPr>
+            <a:spLocks noGrp="1"/>
+          </p:cNvSpPr>
+          <p:nvPr>
+            <p:ph type="sldNum" sz="quarter" idx="5"/>
+          </p:nvPr>
+        </p:nvSpPr>
+        <p:spPr bwMode="auto">
+          <a:noFill/>
+          <a:ln>
+            <a:miter lim="800000"/>
+            <a:headEnd/>
+            <a:tailEnd/>
+          </a:ln>
+        </p:spPr>
+        <p:txBody>
+          <a:bodyPr wrap="square" numCol="1" anchorCtr="0" compatLnSpc="1">
+            <a:prstTxWarp prst="textNoShape">
+              <a:avLst/>
+            </a:prstTxWarp>
+          </a:bodyPr>
           <a:lstStyle/>
           <a:p>
-            <a:fld id="{95733F30-5421-48EA-B41E-64706F652777}" type="slidenum">
-              <a:rPr lang="zh-CN" altLang="en-US" smtClean="0"/>
+            <a:pPr fontAlgn="base">
+              <a:spcBef>
+                <a:spcPct val="0"/>
+              </a:spcBef>
+              <a:spcAft>
+                <a:spcPct val="0"/>
+              </a:spcAft>
+            </a:pPr>
+            <a:fld id="{BB32F9FA-F4BD-4E4F-9117-4958E28657BB}" type="slidenum">
+              <a:rPr lang="zh-CN" altLang="en-US"/>
+              <a:pPr fontAlgn="base">
+                <a:spcBef>
+                  <a:spcPct val="0"/>
+                </a:spcBef>
+                <a:spcAft>
+                  <a:spcPct val="0"/>
+                </a:spcAft>
+              </a:pPr>
               <a:t>2</a:t>
             </a:fld>
             <a:endParaRPr lang="zh-CN" altLang="en-US"/>
@@ -534,11 +692,6 @@
         </p:txBody>
       </p:sp>
     </p:spTree>
-    <p:extLst>
-      <p:ext uri="{BB962C8B-B14F-4D97-AF65-F5344CB8AC3E}">
-        <p14:creationId xmlns:p14="http://schemas.microsoft.com/office/powerpoint/2010/main" val="1266648741"/>
-      </p:ext>
-    </p:extLst>
   </p:cSld>
   <p:clrMapOvr>
     <a:masterClrMapping/>
@@ -673,11 +826,21 @@
         <p:spPr/>
         <p:txBody>
           <a:bodyPr/>
-          <a:lstStyle/>
-          <a:p>
-            <a:fld id="{5E9BB893-1EEE-4A49-8280-0068B075101E}" type="datetimeFigureOut">
-              <a:rPr lang="zh-CN" altLang="en-US" smtClean="0"/>
-              <a:t>2015/1/16</a:t>
+          <a:lstStyle>
+            <a:lvl1pPr>
+              <a:defRPr/>
+            </a:lvl1pPr>
+          </a:lstStyle>
+          <a:p>
+            <a:pPr>
+              <a:defRPr/>
+            </a:pPr>
+            <a:fld id="{F69B6E4E-6D1B-4CDF-AC8F-696EDC3F51B7}" type="datetimeFigureOut">
+              <a:rPr lang="zh-CN" altLang="en-US"/>
+              <a:pPr>
+                <a:defRPr/>
+              </a:pPr>
+              <a:t>2015-2-12</a:t>
             </a:fld>
             <a:endParaRPr lang="zh-CN" altLang="en-US"/>
           </a:p>
@@ -696,8 +859,15 @@
         <p:spPr/>
         <p:txBody>
           <a:bodyPr/>
-          <a:lstStyle/>
-          <a:p>
+          <a:lstStyle>
+            <a:lvl1pPr>
+              <a:defRPr/>
+            </a:lvl1pPr>
+          </a:lstStyle>
+          <a:p>
+            <a:pPr>
+              <a:defRPr/>
+            </a:pPr>
             <a:endParaRPr lang="zh-CN" altLang="en-US"/>
           </a:p>
         </p:txBody>
@@ -715,10 +885,20 @@
         <p:spPr/>
         <p:txBody>
           <a:bodyPr/>
-          <a:lstStyle/>
-          <a:p>
-            <a:fld id="{CB5C24FB-5BF7-4FED-84F5-9980E5428574}" type="slidenum">
-              <a:rPr lang="zh-CN" altLang="en-US" smtClean="0"/>
+          <a:lstStyle>
+            <a:lvl1pPr>
+              <a:defRPr/>
+            </a:lvl1pPr>
+          </a:lstStyle>
+          <a:p>
+            <a:pPr>
+              <a:defRPr/>
+            </a:pPr>
+            <a:fld id="{7E1B41BE-B729-4022-9F44-C67DD91EA038}" type="slidenum">
+              <a:rPr lang="zh-CN" altLang="en-US"/>
+              <a:pPr>
+                <a:defRPr/>
+              </a:pPr>
               <a:t>‹#›</a:t>
             </a:fld>
             <a:endParaRPr lang="zh-CN" altLang="en-US"/>
@@ -726,11 +906,6 @@
         </p:txBody>
       </p:sp>
     </p:spTree>
-    <p:extLst>
-      <p:ext uri="{BB962C8B-B14F-4D97-AF65-F5344CB8AC3E}">
-        <p14:creationId xmlns:p14="http://schemas.microsoft.com/office/powerpoint/2010/main" val="3752428256"/>
-      </p:ext>
-    </p:extLst>
   </p:cSld>
   <p:clrMapOvr>
     <a:masterClrMapping/>
@@ -843,11 +1018,21 @@
         <p:spPr/>
         <p:txBody>
           <a:bodyPr/>
-          <a:lstStyle/>
-          <a:p>
-            <a:fld id="{5E9BB893-1EEE-4A49-8280-0068B075101E}" type="datetimeFigureOut">
-              <a:rPr lang="zh-CN" altLang="en-US" smtClean="0"/>
-              <a:t>2015/1/16</a:t>
+          <a:lstStyle>
+            <a:lvl1pPr>
+              <a:defRPr/>
+            </a:lvl1pPr>
+          </a:lstStyle>
+          <a:p>
+            <a:pPr>
+              <a:defRPr/>
+            </a:pPr>
+            <a:fld id="{F3DF4B4C-57D9-4715-A5CF-8EC454D70F3B}" type="datetimeFigureOut">
+              <a:rPr lang="zh-CN" altLang="en-US"/>
+              <a:pPr>
+                <a:defRPr/>
+              </a:pPr>
+              <a:t>2015-2-12</a:t>
             </a:fld>
             <a:endParaRPr lang="zh-CN" altLang="en-US"/>
           </a:p>
@@ -866,8 +1051,15 @@
         <p:spPr/>
         <p:txBody>
           <a:bodyPr/>
-          <a:lstStyle/>
-          <a:p>
+          <a:lstStyle>
+            <a:lvl1pPr>
+              <a:defRPr/>
+            </a:lvl1pPr>
+          </a:lstStyle>
+          <a:p>
+            <a:pPr>
+              <a:defRPr/>
+            </a:pPr>
             <a:endParaRPr lang="zh-CN" altLang="en-US"/>
           </a:p>
         </p:txBody>
@@ -885,10 +1077,20 @@
         <p:spPr/>
         <p:txBody>
           <a:bodyPr/>
-          <a:lstStyle/>
-          <a:p>
-            <a:fld id="{CB5C24FB-5BF7-4FED-84F5-9980E5428574}" type="slidenum">
-              <a:rPr lang="zh-CN" altLang="en-US" smtClean="0"/>
+          <a:lstStyle>
+            <a:lvl1pPr>
+              <a:defRPr/>
+            </a:lvl1pPr>
+          </a:lstStyle>
+          <a:p>
+            <a:pPr>
+              <a:defRPr/>
+            </a:pPr>
+            <a:fld id="{1C508356-9387-4EF7-AFB5-62E663E1250E}" type="slidenum">
+              <a:rPr lang="zh-CN" altLang="en-US"/>
+              <a:pPr>
+                <a:defRPr/>
+              </a:pPr>
               <a:t>‹#›</a:t>
             </a:fld>
             <a:endParaRPr lang="zh-CN" altLang="en-US"/>
@@ -896,11 +1098,6 @@
         </p:txBody>
       </p:sp>
     </p:spTree>
-    <p:extLst>
-      <p:ext uri="{BB962C8B-B14F-4D97-AF65-F5344CB8AC3E}">
-        <p14:creationId xmlns:p14="http://schemas.microsoft.com/office/powerpoint/2010/main" val="2087279487"/>
-      </p:ext>
-    </p:extLst>
   </p:cSld>
   <p:clrMapOvr>
     <a:masterClrMapping/>
@@ -1023,11 +1220,21 @@
         <p:spPr/>
         <p:txBody>
           <a:bodyPr/>
-          <a:lstStyle/>
-          <a:p>
-            <a:fld id="{5E9BB893-1EEE-4A49-8280-0068B075101E}" type="datetimeFigureOut">
-              <a:rPr lang="zh-CN" altLang="en-US" smtClean="0"/>
-              <a:t>2015/1/16</a:t>
+          <a:lstStyle>
+            <a:lvl1pPr>
+              <a:defRPr/>
+            </a:lvl1pPr>
+          </a:lstStyle>
+          <a:p>
+            <a:pPr>
+              <a:defRPr/>
+            </a:pPr>
+            <a:fld id="{F0B3353C-365E-4E6F-8A0A-B5815F330FB2}" type="datetimeFigureOut">
+              <a:rPr lang="zh-CN" altLang="en-US"/>
+              <a:pPr>
+                <a:defRPr/>
+              </a:pPr>
+              <a:t>2015-2-12</a:t>
             </a:fld>
             <a:endParaRPr lang="zh-CN" altLang="en-US"/>
           </a:p>
@@ -1046,8 +1253,15 @@
         <p:spPr/>
         <p:txBody>
           <a:bodyPr/>
-          <a:lstStyle/>
-          <a:p>
+          <a:lstStyle>
+            <a:lvl1pPr>
+              <a:defRPr/>
+            </a:lvl1pPr>
+          </a:lstStyle>
+          <a:p>
+            <a:pPr>
+              <a:defRPr/>
+            </a:pPr>
             <a:endParaRPr lang="zh-CN" altLang="en-US"/>
           </a:p>
         </p:txBody>
@@ -1065,10 +1279,20 @@
         <p:spPr/>
         <p:txBody>
           <a:bodyPr/>
-          <a:lstStyle/>
-          <a:p>
-            <a:fld id="{CB5C24FB-5BF7-4FED-84F5-9980E5428574}" type="slidenum">
-              <a:rPr lang="zh-CN" altLang="en-US" smtClean="0"/>
+          <a:lstStyle>
+            <a:lvl1pPr>
+              <a:defRPr/>
+            </a:lvl1pPr>
+          </a:lstStyle>
+          <a:p>
+            <a:pPr>
+              <a:defRPr/>
+            </a:pPr>
+            <a:fld id="{293266E3-E887-4687-925D-E9F9E5A5CCDE}" type="slidenum">
+              <a:rPr lang="zh-CN" altLang="en-US"/>
+              <a:pPr>
+                <a:defRPr/>
+              </a:pPr>
               <a:t>‹#›</a:t>
             </a:fld>
             <a:endParaRPr lang="zh-CN" altLang="en-US"/>
@@ -1076,11 +1300,6 @@
         </p:txBody>
       </p:sp>
     </p:spTree>
-    <p:extLst>
-      <p:ext uri="{BB962C8B-B14F-4D97-AF65-F5344CB8AC3E}">
-        <p14:creationId xmlns:p14="http://schemas.microsoft.com/office/powerpoint/2010/main" val="3520190810"/>
-      </p:ext>
-    </p:extLst>
   </p:cSld>
   <p:clrMapOvr>
     <a:masterClrMapping/>
@@ -1193,11 +1412,21 @@
         <p:spPr/>
         <p:txBody>
           <a:bodyPr/>
-          <a:lstStyle/>
-          <a:p>
-            <a:fld id="{5E9BB893-1EEE-4A49-8280-0068B075101E}" type="datetimeFigureOut">
-              <a:rPr lang="zh-CN" altLang="en-US" smtClean="0"/>
-              <a:t>2015/1/16</a:t>
+          <a:lstStyle>
+            <a:lvl1pPr>
+              <a:defRPr/>
+            </a:lvl1pPr>
+          </a:lstStyle>
+          <a:p>
+            <a:pPr>
+              <a:defRPr/>
+            </a:pPr>
+            <a:fld id="{14F547F4-D052-4D1B-AB6A-1E9829C42D2D}" type="datetimeFigureOut">
+              <a:rPr lang="zh-CN" altLang="en-US"/>
+              <a:pPr>
+                <a:defRPr/>
+              </a:pPr>
+              <a:t>2015-2-12</a:t>
             </a:fld>
             <a:endParaRPr lang="zh-CN" altLang="en-US"/>
           </a:p>
@@ -1216,8 +1445,15 @@
         <p:spPr/>
         <p:txBody>
           <a:bodyPr/>
-          <a:lstStyle/>
-          <a:p>
+          <a:lstStyle>
+            <a:lvl1pPr>
+              <a:defRPr/>
+            </a:lvl1pPr>
+          </a:lstStyle>
+          <a:p>
+            <a:pPr>
+              <a:defRPr/>
+            </a:pPr>
             <a:endParaRPr lang="zh-CN" altLang="en-US"/>
           </a:p>
         </p:txBody>
@@ -1235,10 +1471,20 @@
         <p:spPr/>
         <p:txBody>
           <a:bodyPr/>
-          <a:lstStyle/>
-          <a:p>
-            <a:fld id="{CB5C24FB-5BF7-4FED-84F5-9980E5428574}" type="slidenum">
-              <a:rPr lang="zh-CN" altLang="en-US" smtClean="0"/>
+          <a:lstStyle>
+            <a:lvl1pPr>
+              <a:defRPr/>
+            </a:lvl1pPr>
+          </a:lstStyle>
+          <a:p>
+            <a:pPr>
+              <a:defRPr/>
+            </a:pPr>
+            <a:fld id="{54AF2410-18A2-427A-A8C1-7F413E6B2A45}" type="slidenum">
+              <a:rPr lang="zh-CN" altLang="en-US"/>
+              <a:pPr>
+                <a:defRPr/>
+              </a:pPr>
               <a:t>‹#›</a:t>
             </a:fld>
             <a:endParaRPr lang="zh-CN" altLang="en-US"/>
@@ -1246,11 +1492,6 @@
         </p:txBody>
       </p:sp>
     </p:spTree>
-    <p:extLst>
-      <p:ext uri="{BB962C8B-B14F-4D97-AF65-F5344CB8AC3E}">
-        <p14:creationId xmlns:p14="http://schemas.microsoft.com/office/powerpoint/2010/main" val="315738490"/>
-      </p:ext>
-    </p:extLst>
   </p:cSld>
   <p:clrMapOvr>
     <a:masterClrMapping/>
@@ -1439,11 +1680,21 @@
         <p:spPr/>
         <p:txBody>
           <a:bodyPr/>
-          <a:lstStyle/>
-          <a:p>
-            <a:fld id="{5E9BB893-1EEE-4A49-8280-0068B075101E}" type="datetimeFigureOut">
-              <a:rPr lang="zh-CN" altLang="en-US" smtClean="0"/>
-              <a:t>2015/1/16</a:t>
+          <a:lstStyle>
+            <a:lvl1pPr>
+              <a:defRPr/>
+            </a:lvl1pPr>
+          </a:lstStyle>
+          <a:p>
+            <a:pPr>
+              <a:defRPr/>
+            </a:pPr>
+            <a:fld id="{14B4A96A-E6AF-4B9B-9F30-690BD6AF576C}" type="datetimeFigureOut">
+              <a:rPr lang="zh-CN" altLang="en-US"/>
+              <a:pPr>
+                <a:defRPr/>
+              </a:pPr>
+              <a:t>2015-2-12</a:t>
             </a:fld>
             <a:endParaRPr lang="zh-CN" altLang="en-US"/>
           </a:p>
@@ -1462,8 +1713,15 @@
         <p:spPr/>
         <p:txBody>
           <a:bodyPr/>
-          <a:lstStyle/>
-          <a:p>
+          <a:lstStyle>
+            <a:lvl1pPr>
+              <a:defRPr/>
+            </a:lvl1pPr>
+          </a:lstStyle>
+          <a:p>
+            <a:pPr>
+              <a:defRPr/>
+            </a:pPr>
             <a:endParaRPr lang="zh-CN" altLang="en-US"/>
           </a:p>
         </p:txBody>
@@ -1481,10 +1739,20 @@
         <p:spPr/>
         <p:txBody>
           <a:bodyPr/>
-          <a:lstStyle/>
-          <a:p>
-            <a:fld id="{CB5C24FB-5BF7-4FED-84F5-9980E5428574}" type="slidenum">
-              <a:rPr lang="zh-CN" altLang="en-US" smtClean="0"/>
+          <a:lstStyle>
+            <a:lvl1pPr>
+              <a:defRPr/>
+            </a:lvl1pPr>
+          </a:lstStyle>
+          <a:p>
+            <a:pPr>
+              <a:defRPr/>
+            </a:pPr>
+            <a:fld id="{ED307A18-1A61-4592-9313-02792E3B3ED6}" type="slidenum">
+              <a:rPr lang="zh-CN" altLang="en-US"/>
+              <a:pPr>
+                <a:defRPr/>
+              </a:pPr>
               <a:t>‹#›</a:t>
             </a:fld>
             <a:endParaRPr lang="zh-CN" altLang="en-US"/>
@@ -1492,11 +1760,6 @@
         </p:txBody>
       </p:sp>
     </p:spTree>
-    <p:extLst>
-      <p:ext uri="{BB962C8B-B14F-4D97-AF65-F5344CB8AC3E}">
-        <p14:creationId xmlns:p14="http://schemas.microsoft.com/office/powerpoint/2010/main" val="908810456"/>
-      </p:ext>
-    </p:extLst>
   </p:cSld>
   <p:clrMapOvr>
     <a:masterClrMapping/>
@@ -1660,7 +1923,7 @@
       </p:sp>
       <p:sp>
         <p:nvSpPr>
-          <p:cNvPr id="5" name="日期占位符 4"/>
+          <p:cNvPr id="5" name="日期占位符 3"/>
           <p:cNvSpPr>
             <a:spLocks noGrp="1"/>
           </p:cNvSpPr>
@@ -1671,11 +1934,21 @@
         <p:spPr/>
         <p:txBody>
           <a:bodyPr/>
-          <a:lstStyle/>
-          <a:p>
-            <a:fld id="{5E9BB893-1EEE-4A49-8280-0068B075101E}" type="datetimeFigureOut">
-              <a:rPr lang="zh-CN" altLang="en-US" smtClean="0"/>
-              <a:t>2015/1/16</a:t>
+          <a:lstStyle>
+            <a:lvl1pPr>
+              <a:defRPr/>
+            </a:lvl1pPr>
+          </a:lstStyle>
+          <a:p>
+            <a:pPr>
+              <a:defRPr/>
+            </a:pPr>
+            <a:fld id="{5E068647-9966-4809-89CD-EF83E0609F3C}" type="datetimeFigureOut">
+              <a:rPr lang="zh-CN" altLang="en-US"/>
+              <a:pPr>
+                <a:defRPr/>
+              </a:pPr>
+              <a:t>2015-2-12</a:t>
             </a:fld>
             <a:endParaRPr lang="zh-CN" altLang="en-US"/>
           </a:p>
@@ -1683,7 +1956,7 @@
       </p:sp>
       <p:sp>
         <p:nvSpPr>
-          <p:cNvPr id="6" name="页脚占位符 5"/>
+          <p:cNvPr id="6" name="页脚占位符 4"/>
           <p:cNvSpPr>
             <a:spLocks noGrp="1"/>
           </p:cNvSpPr>
@@ -1694,15 +1967,22 @@
         <p:spPr/>
         <p:txBody>
           <a:bodyPr/>
-          <a:lstStyle/>
-          <a:p>
-            <a:endParaRPr lang="zh-CN" altLang="en-US"/>
-          </a:p>
-        </p:txBody>
-      </p:sp>
-      <p:sp>
-        <p:nvSpPr>
-          <p:cNvPr id="7" name="灯片编号占位符 6"/>
+          <a:lstStyle>
+            <a:lvl1pPr>
+              <a:defRPr/>
+            </a:lvl1pPr>
+          </a:lstStyle>
+          <a:p>
+            <a:pPr>
+              <a:defRPr/>
+            </a:pPr>
+            <a:endParaRPr lang="zh-CN" altLang="en-US"/>
+          </a:p>
+        </p:txBody>
+      </p:sp>
+      <p:sp>
+        <p:nvSpPr>
+          <p:cNvPr id="7" name="灯片编号占位符 5"/>
           <p:cNvSpPr>
             <a:spLocks noGrp="1"/>
           </p:cNvSpPr>
@@ -1713,10 +1993,20 @@
         <p:spPr/>
         <p:txBody>
           <a:bodyPr/>
-          <a:lstStyle/>
-          <a:p>
-            <a:fld id="{CB5C24FB-5BF7-4FED-84F5-9980E5428574}" type="slidenum">
-              <a:rPr lang="zh-CN" altLang="en-US" smtClean="0"/>
+          <a:lstStyle>
+            <a:lvl1pPr>
+              <a:defRPr/>
+            </a:lvl1pPr>
+          </a:lstStyle>
+          <a:p>
+            <a:pPr>
+              <a:defRPr/>
+            </a:pPr>
+            <a:fld id="{98F71B82-B7C0-4DA4-952F-1142EE7F1032}" type="slidenum">
+              <a:rPr lang="zh-CN" altLang="en-US"/>
+              <a:pPr>
+                <a:defRPr/>
+              </a:pPr>
               <a:t>‹#›</a:t>
             </a:fld>
             <a:endParaRPr lang="zh-CN" altLang="en-US"/>
@@ -1724,11 +2014,6 @@
         </p:txBody>
       </p:sp>
     </p:spTree>
-    <p:extLst>
-      <p:ext uri="{BB962C8B-B14F-4D97-AF65-F5344CB8AC3E}">
-        <p14:creationId xmlns:p14="http://schemas.microsoft.com/office/powerpoint/2010/main" val="3743248843"/>
-      </p:ext>
-    </p:extLst>
   </p:cSld>
   <p:clrMapOvr>
     <a:masterClrMapping/>
@@ -2027,7 +2312,7 @@
       </p:sp>
       <p:sp>
         <p:nvSpPr>
-          <p:cNvPr id="7" name="日期占位符 6"/>
+          <p:cNvPr id="7" name="日期占位符 3"/>
           <p:cNvSpPr>
             <a:spLocks noGrp="1"/>
           </p:cNvSpPr>
@@ -2038,11 +2323,21 @@
         <p:spPr/>
         <p:txBody>
           <a:bodyPr/>
-          <a:lstStyle/>
-          <a:p>
-            <a:fld id="{5E9BB893-1EEE-4A49-8280-0068B075101E}" type="datetimeFigureOut">
-              <a:rPr lang="zh-CN" altLang="en-US" smtClean="0"/>
-              <a:t>2015/1/16</a:t>
+          <a:lstStyle>
+            <a:lvl1pPr>
+              <a:defRPr/>
+            </a:lvl1pPr>
+          </a:lstStyle>
+          <a:p>
+            <a:pPr>
+              <a:defRPr/>
+            </a:pPr>
+            <a:fld id="{4155424E-1062-4125-8D5F-18685DEFC710}" type="datetimeFigureOut">
+              <a:rPr lang="zh-CN" altLang="en-US"/>
+              <a:pPr>
+                <a:defRPr/>
+              </a:pPr>
+              <a:t>2015-2-12</a:t>
             </a:fld>
             <a:endParaRPr lang="zh-CN" altLang="en-US"/>
           </a:p>
@@ -2050,7 +2345,7 @@
       </p:sp>
       <p:sp>
         <p:nvSpPr>
-          <p:cNvPr id="8" name="页脚占位符 7"/>
+          <p:cNvPr id="8" name="页脚占位符 4"/>
           <p:cNvSpPr>
             <a:spLocks noGrp="1"/>
           </p:cNvSpPr>
@@ -2061,15 +2356,22 @@
         <p:spPr/>
         <p:txBody>
           <a:bodyPr/>
-          <a:lstStyle/>
-          <a:p>
-            <a:endParaRPr lang="zh-CN" altLang="en-US"/>
-          </a:p>
-        </p:txBody>
-      </p:sp>
-      <p:sp>
-        <p:nvSpPr>
-          <p:cNvPr id="9" name="灯片编号占位符 8"/>
+          <a:lstStyle>
+            <a:lvl1pPr>
+              <a:defRPr/>
+            </a:lvl1pPr>
+          </a:lstStyle>
+          <a:p>
+            <a:pPr>
+              <a:defRPr/>
+            </a:pPr>
+            <a:endParaRPr lang="zh-CN" altLang="en-US"/>
+          </a:p>
+        </p:txBody>
+      </p:sp>
+      <p:sp>
+        <p:nvSpPr>
+          <p:cNvPr id="9" name="灯片编号占位符 5"/>
           <p:cNvSpPr>
             <a:spLocks noGrp="1"/>
           </p:cNvSpPr>
@@ -2080,10 +2382,20 @@
         <p:spPr/>
         <p:txBody>
           <a:bodyPr/>
-          <a:lstStyle/>
-          <a:p>
-            <a:fld id="{CB5C24FB-5BF7-4FED-84F5-9980E5428574}" type="slidenum">
-              <a:rPr lang="zh-CN" altLang="en-US" smtClean="0"/>
+          <a:lstStyle>
+            <a:lvl1pPr>
+              <a:defRPr/>
+            </a:lvl1pPr>
+          </a:lstStyle>
+          <a:p>
+            <a:pPr>
+              <a:defRPr/>
+            </a:pPr>
+            <a:fld id="{39BC9AAD-7D47-49C3-BC10-61F9A5F7969A}" type="slidenum">
+              <a:rPr lang="zh-CN" altLang="en-US"/>
+              <a:pPr>
+                <a:defRPr/>
+              </a:pPr>
               <a:t>‹#›</a:t>
             </a:fld>
             <a:endParaRPr lang="zh-CN" altLang="en-US"/>
@@ -2091,11 +2403,6 @@
         </p:txBody>
       </p:sp>
     </p:spTree>
-    <p:extLst>
-      <p:ext uri="{BB962C8B-B14F-4D97-AF65-F5344CB8AC3E}">
-        <p14:creationId xmlns:p14="http://schemas.microsoft.com/office/powerpoint/2010/main" val="3692852680"/>
-      </p:ext>
-    </p:extLst>
   </p:cSld>
   <p:clrMapOvr>
     <a:masterClrMapping/>
@@ -2145,7 +2452,7 @@
       </p:sp>
       <p:sp>
         <p:nvSpPr>
-          <p:cNvPr id="3" name="日期占位符 2"/>
+          <p:cNvPr id="3" name="日期占位符 3"/>
           <p:cNvSpPr>
             <a:spLocks noGrp="1"/>
           </p:cNvSpPr>
@@ -2156,11 +2463,21 @@
         <p:spPr/>
         <p:txBody>
           <a:bodyPr/>
-          <a:lstStyle/>
-          <a:p>
-            <a:fld id="{5E9BB893-1EEE-4A49-8280-0068B075101E}" type="datetimeFigureOut">
-              <a:rPr lang="zh-CN" altLang="en-US" smtClean="0"/>
-              <a:t>2015/1/16</a:t>
+          <a:lstStyle>
+            <a:lvl1pPr>
+              <a:defRPr/>
+            </a:lvl1pPr>
+          </a:lstStyle>
+          <a:p>
+            <a:pPr>
+              <a:defRPr/>
+            </a:pPr>
+            <a:fld id="{1C0311F1-E6D0-4044-A474-C2A058AF2DB7}" type="datetimeFigureOut">
+              <a:rPr lang="zh-CN" altLang="en-US"/>
+              <a:pPr>
+                <a:defRPr/>
+              </a:pPr>
+              <a:t>2015-2-12</a:t>
             </a:fld>
             <a:endParaRPr lang="zh-CN" altLang="en-US"/>
           </a:p>
@@ -2168,7 +2485,7 @@
       </p:sp>
       <p:sp>
         <p:nvSpPr>
-          <p:cNvPr id="4" name="页脚占位符 3"/>
+          <p:cNvPr id="4" name="页脚占位符 4"/>
           <p:cNvSpPr>
             <a:spLocks noGrp="1"/>
           </p:cNvSpPr>
@@ -2179,15 +2496,22 @@
         <p:spPr/>
         <p:txBody>
           <a:bodyPr/>
-          <a:lstStyle/>
-          <a:p>
-            <a:endParaRPr lang="zh-CN" altLang="en-US"/>
-          </a:p>
-        </p:txBody>
-      </p:sp>
-      <p:sp>
-        <p:nvSpPr>
-          <p:cNvPr id="5" name="灯片编号占位符 4"/>
+          <a:lstStyle>
+            <a:lvl1pPr>
+              <a:defRPr/>
+            </a:lvl1pPr>
+          </a:lstStyle>
+          <a:p>
+            <a:pPr>
+              <a:defRPr/>
+            </a:pPr>
+            <a:endParaRPr lang="zh-CN" altLang="en-US"/>
+          </a:p>
+        </p:txBody>
+      </p:sp>
+      <p:sp>
+        <p:nvSpPr>
+          <p:cNvPr id="5" name="灯片编号占位符 5"/>
           <p:cNvSpPr>
             <a:spLocks noGrp="1"/>
           </p:cNvSpPr>
@@ -2198,10 +2522,20 @@
         <p:spPr/>
         <p:txBody>
           <a:bodyPr/>
-          <a:lstStyle/>
-          <a:p>
-            <a:fld id="{CB5C24FB-5BF7-4FED-84F5-9980E5428574}" type="slidenum">
-              <a:rPr lang="zh-CN" altLang="en-US" smtClean="0"/>
+          <a:lstStyle>
+            <a:lvl1pPr>
+              <a:defRPr/>
+            </a:lvl1pPr>
+          </a:lstStyle>
+          <a:p>
+            <a:pPr>
+              <a:defRPr/>
+            </a:pPr>
+            <a:fld id="{9B0F6FDC-DB6D-4392-8084-BA386D282094}" type="slidenum">
+              <a:rPr lang="zh-CN" altLang="en-US"/>
+              <a:pPr>
+                <a:defRPr/>
+              </a:pPr>
               <a:t>‹#›</a:t>
             </a:fld>
             <a:endParaRPr lang="zh-CN" altLang="en-US"/>
@@ -2209,11 +2543,6 @@
         </p:txBody>
       </p:sp>
     </p:spTree>
-    <p:extLst>
-      <p:ext uri="{BB962C8B-B14F-4D97-AF65-F5344CB8AC3E}">
-        <p14:creationId xmlns:p14="http://schemas.microsoft.com/office/powerpoint/2010/main" val="3846058439"/>
-      </p:ext>
-    </p:extLst>
   </p:cSld>
   <p:clrMapOvr>
     <a:masterClrMapping/>
@@ -2240,7 +2569,7 @@
       </p:grpSpPr>
       <p:sp>
         <p:nvSpPr>
-          <p:cNvPr id="2" name="日期占位符 1"/>
+          <p:cNvPr id="2" name="日期占位符 3"/>
           <p:cNvSpPr>
             <a:spLocks noGrp="1"/>
           </p:cNvSpPr>
@@ -2251,11 +2580,21 @@
         <p:spPr/>
         <p:txBody>
           <a:bodyPr/>
-          <a:lstStyle/>
-          <a:p>
-            <a:fld id="{5E9BB893-1EEE-4A49-8280-0068B075101E}" type="datetimeFigureOut">
-              <a:rPr lang="zh-CN" altLang="en-US" smtClean="0"/>
-              <a:t>2015/1/16</a:t>
+          <a:lstStyle>
+            <a:lvl1pPr>
+              <a:defRPr/>
+            </a:lvl1pPr>
+          </a:lstStyle>
+          <a:p>
+            <a:pPr>
+              <a:defRPr/>
+            </a:pPr>
+            <a:fld id="{1B711772-0C1F-44A6-AC75-DB8681471498}" type="datetimeFigureOut">
+              <a:rPr lang="zh-CN" altLang="en-US"/>
+              <a:pPr>
+                <a:defRPr/>
+              </a:pPr>
+              <a:t>2015-2-12</a:t>
             </a:fld>
             <a:endParaRPr lang="zh-CN" altLang="en-US"/>
           </a:p>
@@ -2263,7 +2602,7 @@
       </p:sp>
       <p:sp>
         <p:nvSpPr>
-          <p:cNvPr id="3" name="页脚占位符 2"/>
+          <p:cNvPr id="3" name="页脚占位符 4"/>
           <p:cNvSpPr>
             <a:spLocks noGrp="1"/>
           </p:cNvSpPr>
@@ -2274,15 +2613,22 @@
         <p:spPr/>
         <p:txBody>
           <a:bodyPr/>
-          <a:lstStyle/>
-          <a:p>
-            <a:endParaRPr lang="zh-CN" altLang="en-US"/>
-          </a:p>
-        </p:txBody>
-      </p:sp>
-      <p:sp>
-        <p:nvSpPr>
-          <p:cNvPr id="4" name="灯片编号占位符 3"/>
+          <a:lstStyle>
+            <a:lvl1pPr>
+              <a:defRPr/>
+            </a:lvl1pPr>
+          </a:lstStyle>
+          <a:p>
+            <a:pPr>
+              <a:defRPr/>
+            </a:pPr>
+            <a:endParaRPr lang="zh-CN" altLang="en-US"/>
+          </a:p>
+        </p:txBody>
+      </p:sp>
+      <p:sp>
+        <p:nvSpPr>
+          <p:cNvPr id="4" name="灯片编号占位符 5"/>
           <p:cNvSpPr>
             <a:spLocks noGrp="1"/>
           </p:cNvSpPr>
@@ -2293,10 +2639,20 @@
         <p:spPr/>
         <p:txBody>
           <a:bodyPr/>
-          <a:lstStyle/>
-          <a:p>
-            <a:fld id="{CB5C24FB-5BF7-4FED-84F5-9980E5428574}" type="slidenum">
-              <a:rPr lang="zh-CN" altLang="en-US" smtClean="0"/>
+          <a:lstStyle>
+            <a:lvl1pPr>
+              <a:defRPr/>
+            </a:lvl1pPr>
+          </a:lstStyle>
+          <a:p>
+            <a:pPr>
+              <a:defRPr/>
+            </a:pPr>
+            <a:fld id="{94313673-8C3E-4677-935B-17A7BC760CC1}" type="slidenum">
+              <a:rPr lang="zh-CN" altLang="en-US"/>
+              <a:pPr>
+                <a:defRPr/>
+              </a:pPr>
               <a:t>‹#›</a:t>
             </a:fld>
             <a:endParaRPr lang="zh-CN" altLang="en-US"/>
@@ -2304,11 +2660,6 @@
         </p:txBody>
       </p:sp>
     </p:spTree>
-    <p:extLst>
-      <p:ext uri="{BB962C8B-B14F-4D97-AF65-F5344CB8AC3E}">
-        <p14:creationId xmlns:p14="http://schemas.microsoft.com/office/powerpoint/2010/main" val="2609816605"/>
-      </p:ext>
-    </p:extLst>
   </p:cSld>
   <p:clrMapOvr>
     <a:masterClrMapping/>
@@ -2517,7 +2868,7 @@
       </p:sp>
       <p:sp>
         <p:nvSpPr>
-          <p:cNvPr id="5" name="日期占位符 4"/>
+          <p:cNvPr id="5" name="日期占位符 3"/>
           <p:cNvSpPr>
             <a:spLocks noGrp="1"/>
           </p:cNvSpPr>
@@ -2528,11 +2879,21 @@
         <p:spPr/>
         <p:txBody>
           <a:bodyPr/>
-          <a:lstStyle/>
-          <a:p>
-            <a:fld id="{5E9BB893-1EEE-4A49-8280-0068B075101E}" type="datetimeFigureOut">
-              <a:rPr lang="zh-CN" altLang="en-US" smtClean="0"/>
-              <a:t>2015/1/16</a:t>
+          <a:lstStyle>
+            <a:lvl1pPr>
+              <a:defRPr/>
+            </a:lvl1pPr>
+          </a:lstStyle>
+          <a:p>
+            <a:pPr>
+              <a:defRPr/>
+            </a:pPr>
+            <a:fld id="{9332CE7C-31FB-4872-9F9E-3B7475F20232}" type="datetimeFigureOut">
+              <a:rPr lang="zh-CN" altLang="en-US"/>
+              <a:pPr>
+                <a:defRPr/>
+              </a:pPr>
+              <a:t>2015-2-12</a:t>
             </a:fld>
             <a:endParaRPr lang="zh-CN" altLang="en-US"/>
           </a:p>
@@ -2540,7 +2901,7 @@
       </p:sp>
       <p:sp>
         <p:nvSpPr>
-          <p:cNvPr id="6" name="页脚占位符 5"/>
+          <p:cNvPr id="6" name="页脚占位符 4"/>
           <p:cNvSpPr>
             <a:spLocks noGrp="1"/>
           </p:cNvSpPr>
@@ -2551,15 +2912,22 @@
         <p:spPr/>
         <p:txBody>
           <a:bodyPr/>
-          <a:lstStyle/>
-          <a:p>
-            <a:endParaRPr lang="zh-CN" altLang="en-US"/>
-          </a:p>
-        </p:txBody>
-      </p:sp>
-      <p:sp>
-        <p:nvSpPr>
-          <p:cNvPr id="7" name="灯片编号占位符 6"/>
+          <a:lstStyle>
+            <a:lvl1pPr>
+              <a:defRPr/>
+            </a:lvl1pPr>
+          </a:lstStyle>
+          <a:p>
+            <a:pPr>
+              <a:defRPr/>
+            </a:pPr>
+            <a:endParaRPr lang="zh-CN" altLang="en-US"/>
+          </a:p>
+        </p:txBody>
+      </p:sp>
+      <p:sp>
+        <p:nvSpPr>
+          <p:cNvPr id="7" name="灯片编号占位符 5"/>
           <p:cNvSpPr>
             <a:spLocks noGrp="1"/>
           </p:cNvSpPr>
@@ -2570,10 +2938,20 @@
         <p:spPr/>
         <p:txBody>
           <a:bodyPr/>
-          <a:lstStyle/>
-          <a:p>
-            <a:fld id="{CB5C24FB-5BF7-4FED-84F5-9980E5428574}" type="slidenum">
-              <a:rPr lang="zh-CN" altLang="en-US" smtClean="0"/>
+          <a:lstStyle>
+            <a:lvl1pPr>
+              <a:defRPr/>
+            </a:lvl1pPr>
+          </a:lstStyle>
+          <a:p>
+            <a:pPr>
+              <a:defRPr/>
+            </a:pPr>
+            <a:fld id="{A3A7457D-1F17-41F3-A4A7-1E02270DA0A1}" type="slidenum">
+              <a:rPr lang="zh-CN" altLang="en-US"/>
+              <a:pPr>
+                <a:defRPr/>
+              </a:pPr>
               <a:t>‹#›</a:t>
             </a:fld>
             <a:endParaRPr lang="zh-CN" altLang="en-US"/>
@@ -2581,11 +2959,6 @@
         </p:txBody>
       </p:sp>
     </p:spTree>
-    <p:extLst>
-      <p:ext uri="{BB962C8B-B14F-4D97-AF65-F5344CB8AC3E}">
-        <p14:creationId xmlns:p14="http://schemas.microsoft.com/office/powerpoint/2010/main" val="2421365543"/>
-      </p:ext>
-    </p:extLst>
   </p:cSld>
   <p:clrMapOvr>
     <a:masterClrMapping/>
@@ -2659,7 +3032,9 @@
           </a:xfrm>
         </p:spPr>
         <p:txBody>
-          <a:bodyPr/>
+          <a:bodyPr rtlCol="0">
+            <a:normAutofit/>
+          </a:bodyPr>
           <a:lstStyle>
             <a:lvl1pPr marL="0" indent="0">
               <a:buNone/>
@@ -2699,7 +3074,8 @@
             </a:lvl9pPr>
           </a:lstStyle>
           <a:p>
-            <a:endParaRPr lang="zh-CN" altLang="en-US"/>
+            <a:pPr lvl="0"/>
+            <a:endParaRPr lang="zh-CN" altLang="en-US" noProof="0"/>
           </a:p>
         </p:txBody>
       </p:sp>
@@ -2770,7 +3146,7 @@
       </p:sp>
       <p:sp>
         <p:nvSpPr>
-          <p:cNvPr id="5" name="日期占位符 4"/>
+          <p:cNvPr id="5" name="日期占位符 3"/>
           <p:cNvSpPr>
             <a:spLocks noGrp="1"/>
           </p:cNvSpPr>
@@ -2781,11 +3157,21 @@
         <p:spPr/>
         <p:txBody>
           <a:bodyPr/>
-          <a:lstStyle/>
-          <a:p>
-            <a:fld id="{5E9BB893-1EEE-4A49-8280-0068B075101E}" type="datetimeFigureOut">
-              <a:rPr lang="zh-CN" altLang="en-US" smtClean="0"/>
-              <a:t>2015/1/16</a:t>
+          <a:lstStyle>
+            <a:lvl1pPr>
+              <a:defRPr/>
+            </a:lvl1pPr>
+          </a:lstStyle>
+          <a:p>
+            <a:pPr>
+              <a:defRPr/>
+            </a:pPr>
+            <a:fld id="{BD95FBA6-4053-4469-99CD-4DF209136224}" type="datetimeFigureOut">
+              <a:rPr lang="zh-CN" altLang="en-US"/>
+              <a:pPr>
+                <a:defRPr/>
+              </a:pPr>
+              <a:t>2015-2-12</a:t>
             </a:fld>
             <a:endParaRPr lang="zh-CN" altLang="en-US"/>
           </a:p>
@@ -2793,7 +3179,7 @@
       </p:sp>
       <p:sp>
         <p:nvSpPr>
-          <p:cNvPr id="6" name="页脚占位符 5"/>
+          <p:cNvPr id="6" name="页脚占位符 4"/>
           <p:cNvSpPr>
             <a:spLocks noGrp="1"/>
           </p:cNvSpPr>
@@ -2804,15 +3190,22 @@
         <p:spPr/>
         <p:txBody>
           <a:bodyPr/>
-          <a:lstStyle/>
-          <a:p>
-            <a:endParaRPr lang="zh-CN" altLang="en-US"/>
-          </a:p>
-        </p:txBody>
-      </p:sp>
-      <p:sp>
-        <p:nvSpPr>
-          <p:cNvPr id="7" name="灯片编号占位符 6"/>
+          <a:lstStyle>
+            <a:lvl1pPr>
+              <a:defRPr/>
+            </a:lvl1pPr>
+          </a:lstStyle>
+          <a:p>
+            <a:pPr>
+              <a:defRPr/>
+            </a:pPr>
+            <a:endParaRPr lang="zh-CN" altLang="en-US"/>
+          </a:p>
+        </p:txBody>
+      </p:sp>
+      <p:sp>
+        <p:nvSpPr>
+          <p:cNvPr id="7" name="灯片编号占位符 5"/>
           <p:cNvSpPr>
             <a:spLocks noGrp="1"/>
           </p:cNvSpPr>
@@ -2823,10 +3216,20 @@
         <p:spPr/>
         <p:txBody>
           <a:bodyPr/>
-          <a:lstStyle/>
-          <a:p>
-            <a:fld id="{CB5C24FB-5BF7-4FED-84F5-9980E5428574}" type="slidenum">
-              <a:rPr lang="zh-CN" altLang="en-US" smtClean="0"/>
+          <a:lstStyle>
+            <a:lvl1pPr>
+              <a:defRPr/>
+            </a:lvl1pPr>
+          </a:lstStyle>
+          <a:p>
+            <a:pPr>
+              <a:defRPr/>
+            </a:pPr>
+            <a:fld id="{7D94A745-FCC0-437B-BE35-7213242E8762}" type="slidenum">
+              <a:rPr lang="zh-CN" altLang="en-US"/>
+              <a:pPr>
+                <a:defRPr/>
+              </a:pPr>
               <a:t>‹#›</a:t>
             </a:fld>
             <a:endParaRPr lang="zh-CN" altLang="en-US"/>
@@ -2834,11 +3237,6 @@
         </p:txBody>
       </p:sp>
     </p:spTree>
-    <p:extLst>
-      <p:ext uri="{BB962C8B-B14F-4D97-AF65-F5344CB8AC3E}">
-        <p14:creationId xmlns:p14="http://schemas.microsoft.com/office/powerpoint/2010/main" val="1767041213"/>
-      </p:ext>
-    </p:extLst>
   </p:cSld>
   <p:clrMapOvr>
     <a:masterClrMapping/>
@@ -2870,7 +3268,7 @@
       </p:grpSpPr>
       <p:sp>
         <p:nvSpPr>
-          <p:cNvPr id="2" name="标题占位符 1"/>
+          <p:cNvPr id="1026" name="标题占位符 1"/>
           <p:cNvSpPr>
             <a:spLocks noGrp="1"/>
           </p:cNvSpPr>
@@ -2878,7 +3276,7 @@
             <p:ph type="title"/>
           </p:nvPr>
         </p:nvSpPr>
-        <p:spPr>
+        <p:spPr bwMode="auto">
           <a:xfrm>
             <a:off x="838200" y="365125"/>
             <a:ext cx="10515600" cy="1325563"/>
@@ -2886,24 +3284,33 @@
           <a:prstGeom prst="rect">
             <a:avLst/>
           </a:prstGeom>
+          <a:noFill/>
+          <a:ln w="9525">
+            <a:noFill/>
+            <a:miter lim="800000"/>
+            <a:headEnd/>
+            <a:tailEnd/>
+          </a:ln>
         </p:spPr>
         <p:txBody>
-          <a:bodyPr vert="horz" lIns="91440" tIns="45720" rIns="91440" bIns="45720" rtlCol="0" anchor="ctr">
-            <a:normAutofit/>
+          <a:bodyPr vert="horz" wrap="square" lIns="91440" tIns="45720" rIns="91440" bIns="45720" numCol="1" anchor="ctr" anchorCtr="0" compatLnSpc="1">
+            <a:prstTxWarp prst="textNoShape">
+              <a:avLst/>
+            </a:prstTxWarp>
           </a:bodyPr>
           <a:lstStyle/>
           <a:p>
+            <a:pPr lvl="0"/>
             <a:r>
               <a:rPr lang="zh-CN" altLang="en-US" smtClean="0"/>
               <a:t>单击此处编辑母版标题样式</a:t>
             </a:r>
-            <a:endParaRPr lang="zh-CN" altLang="en-US"/>
-          </a:p>
-        </p:txBody>
-      </p:sp>
-      <p:sp>
-        <p:nvSpPr>
-          <p:cNvPr id="3" name="文本占位符 2"/>
+          </a:p>
+        </p:txBody>
+      </p:sp>
+      <p:sp>
+        <p:nvSpPr>
+          <p:cNvPr id="1027" name="文本占位符 2"/>
           <p:cNvSpPr>
             <a:spLocks noGrp="1"/>
           </p:cNvSpPr>
@@ -2911,7 +3318,7 @@
             <p:ph type="body" idx="1"/>
           </p:nvPr>
         </p:nvSpPr>
-        <p:spPr>
+        <p:spPr bwMode="auto">
           <a:xfrm>
             <a:off x="838200" y="1825625"/>
             <a:ext cx="10515600" cy="4351338"/>
@@ -2919,10 +3326,19 @@
           <a:prstGeom prst="rect">
             <a:avLst/>
           </a:prstGeom>
+          <a:noFill/>
+          <a:ln w="9525">
+            <a:noFill/>
+            <a:miter lim="800000"/>
+            <a:headEnd/>
+            <a:tailEnd/>
+          </a:ln>
         </p:spPr>
         <p:txBody>
-          <a:bodyPr vert="horz" lIns="91440" tIns="45720" rIns="91440" bIns="45720" rtlCol="0">
-            <a:normAutofit/>
+          <a:bodyPr vert="horz" wrap="square" lIns="91440" tIns="45720" rIns="91440" bIns="45720" numCol="1" anchor="t" anchorCtr="0" compatLnSpc="1">
+            <a:prstTxWarp prst="textNoShape">
+              <a:avLst/>
+            </a:prstTxWarp>
           </a:bodyPr>
           <a:lstStyle/>
           <a:p>
@@ -2959,7 +3375,6 @@
               <a:rPr lang="zh-CN" altLang="en-US" smtClean="0"/>
               <a:t>第五级</a:t>
             </a:r>
-            <a:endParaRPr lang="zh-CN" altLang="en-US"/>
           </a:p>
         </p:txBody>
       </p:sp>
@@ -2985,20 +3400,34 @@
         <p:txBody>
           <a:bodyPr vert="horz" lIns="91440" tIns="45720" rIns="91440" bIns="45720" rtlCol="0" anchor="ctr"/>
           <a:lstStyle>
-            <a:lvl1pPr algn="l">
-              <a:defRPr sz="1200">
+            <a:lvl1pPr algn="l" fontAlgn="auto">
+              <a:spcBef>
+                <a:spcPts val="0"/>
+              </a:spcBef>
+              <a:spcAft>
+                <a:spcPts val="0"/>
+              </a:spcAft>
+              <a:defRPr sz="1200" smtClean="0">
                 <a:solidFill>
                   <a:schemeClr val="tx1">
                     <a:tint val="75000"/>
                   </a:schemeClr>
                 </a:solidFill>
+                <a:latin typeface="+mn-lt"/>
+                <a:ea typeface="+mn-ea"/>
               </a:defRPr>
             </a:lvl1pPr>
           </a:lstStyle>
           <a:p>
-            <a:fld id="{5E9BB893-1EEE-4A49-8280-0068B075101E}" type="datetimeFigureOut">
-              <a:rPr lang="zh-CN" altLang="en-US" smtClean="0"/>
-              <a:t>2015/1/16</a:t>
+            <a:pPr>
+              <a:defRPr/>
+            </a:pPr>
+            <a:fld id="{C0371642-77F1-4655-A169-4C00E716F684}" type="datetimeFigureOut">
+              <a:rPr lang="zh-CN" altLang="en-US"/>
+              <a:pPr>
+                <a:defRPr/>
+              </a:pPr>
+              <a:t>2015-2-12</a:t>
             </a:fld>
             <a:endParaRPr lang="zh-CN" altLang="en-US"/>
           </a:p>
@@ -3026,17 +3455,28 @@
         <p:txBody>
           <a:bodyPr vert="horz" lIns="91440" tIns="45720" rIns="91440" bIns="45720" rtlCol="0" anchor="ctr"/>
           <a:lstStyle>
-            <a:lvl1pPr algn="ctr">
+            <a:lvl1pPr algn="ctr" fontAlgn="auto">
+              <a:spcBef>
+                <a:spcPts val="0"/>
+              </a:spcBef>
+              <a:spcAft>
+                <a:spcPts val="0"/>
+              </a:spcAft>
               <a:defRPr sz="1200">
                 <a:solidFill>
                   <a:schemeClr val="tx1">
                     <a:tint val="75000"/>
                   </a:schemeClr>
                 </a:solidFill>
+                <a:latin typeface="+mn-lt"/>
+                <a:ea typeface="+mn-ea"/>
               </a:defRPr>
             </a:lvl1pPr>
           </a:lstStyle>
           <a:p>
+            <a:pPr>
+              <a:defRPr/>
+            </a:pPr>
             <a:endParaRPr lang="zh-CN" altLang="en-US"/>
           </a:p>
         </p:txBody>
@@ -3063,19 +3503,33 @@
         <p:txBody>
           <a:bodyPr vert="horz" lIns="91440" tIns="45720" rIns="91440" bIns="45720" rtlCol="0" anchor="ctr"/>
           <a:lstStyle>
-            <a:lvl1pPr algn="r">
-              <a:defRPr sz="1200">
+            <a:lvl1pPr algn="r" fontAlgn="auto">
+              <a:spcBef>
+                <a:spcPts val="0"/>
+              </a:spcBef>
+              <a:spcAft>
+                <a:spcPts val="0"/>
+              </a:spcAft>
+              <a:defRPr sz="1200" smtClean="0">
                 <a:solidFill>
                   <a:schemeClr val="tx1">
                     <a:tint val="75000"/>
                   </a:schemeClr>
                 </a:solidFill>
+                <a:latin typeface="+mn-lt"/>
+                <a:ea typeface="+mn-ea"/>
               </a:defRPr>
             </a:lvl1pPr>
           </a:lstStyle>
           <a:p>
-            <a:fld id="{CB5C24FB-5BF7-4FED-84F5-9980E5428574}" type="slidenum">
-              <a:rPr lang="zh-CN" altLang="en-US" smtClean="0"/>
+            <a:pPr>
+              <a:defRPr/>
+            </a:pPr>
+            <a:fld id="{07282B25-3594-4919-963D-CBFCAD5B4719}" type="slidenum">
+              <a:rPr lang="zh-CN" altLang="en-US"/>
+              <a:pPr>
+                <a:defRPr/>
+              </a:pPr>
               <a:t>‹#›</a:t>
             </a:fld>
             <a:endParaRPr lang="zh-CN" altLang="en-US"/>
@@ -3083,11 +3537,6 @@
         </p:txBody>
       </p:sp>
     </p:spTree>
-    <p:extLst>
-      <p:ext uri="{BB962C8B-B14F-4D97-AF65-F5344CB8AC3E}">
-        <p14:creationId xmlns:p14="http://schemas.microsoft.com/office/powerpoint/2010/main" val="2795880628"/>
-      </p:ext>
-    </p:extLst>
   </p:cSld>
   <p:clrMap bg1="lt1" tx1="dk1" bg2="lt2" tx2="dk2" accent1="accent1" accent2="accent2" accent3="accent3" accent4="accent4" accent5="accent5" accent6="accent6" hlink="hlink" folHlink="folHlink"/>
   <p:sldLayoutIdLst>
@@ -3105,14 +3554,16 @@
   </p:sldLayoutIdLst>
   <p:txStyles>
     <p:titleStyle>
-      <a:lvl1pPr algn="l" defTabSz="914400" rtl="0" eaLnBrk="1" latinLnBrk="0" hangingPunct="1">
+      <a:lvl1pPr algn="l" rtl="0" fontAlgn="base">
         <a:lnSpc>
           <a:spcPct val="90000"/>
         </a:lnSpc>
         <a:spcBef>
           <a:spcPct val="0"/>
         </a:spcBef>
-        <a:buNone/>
+        <a:spcAft>
+          <a:spcPct val="0"/>
+        </a:spcAft>
         <a:defRPr sz="4400" kern="1200">
           <a:solidFill>
             <a:schemeClr val="tx1"/>
@@ -3122,16 +3573,163 @@
           <a:cs typeface="+mj-cs"/>
         </a:defRPr>
       </a:lvl1pPr>
+      <a:lvl2pPr algn="l" rtl="0" fontAlgn="base">
+        <a:lnSpc>
+          <a:spcPct val="90000"/>
+        </a:lnSpc>
+        <a:spcBef>
+          <a:spcPct val="0"/>
+        </a:spcBef>
+        <a:spcAft>
+          <a:spcPct val="0"/>
+        </a:spcAft>
+        <a:defRPr sz="4400">
+          <a:solidFill>
+            <a:schemeClr val="tx1"/>
+          </a:solidFill>
+          <a:latin typeface="Calibri Light"/>
+          <a:ea typeface="宋体" pitchFamily="2" charset="-122"/>
+        </a:defRPr>
+      </a:lvl2pPr>
+      <a:lvl3pPr algn="l" rtl="0" fontAlgn="base">
+        <a:lnSpc>
+          <a:spcPct val="90000"/>
+        </a:lnSpc>
+        <a:spcBef>
+          <a:spcPct val="0"/>
+        </a:spcBef>
+        <a:spcAft>
+          <a:spcPct val="0"/>
+        </a:spcAft>
+        <a:defRPr sz="4400">
+          <a:solidFill>
+            <a:schemeClr val="tx1"/>
+          </a:solidFill>
+          <a:latin typeface="Calibri Light"/>
+          <a:ea typeface="宋体" pitchFamily="2" charset="-122"/>
+        </a:defRPr>
+      </a:lvl3pPr>
+      <a:lvl4pPr algn="l" rtl="0" fontAlgn="base">
+        <a:lnSpc>
+          <a:spcPct val="90000"/>
+        </a:lnSpc>
+        <a:spcBef>
+          <a:spcPct val="0"/>
+        </a:spcBef>
+        <a:spcAft>
+          <a:spcPct val="0"/>
+        </a:spcAft>
+        <a:defRPr sz="4400">
+          <a:solidFill>
+            <a:schemeClr val="tx1"/>
+          </a:solidFill>
+          <a:latin typeface="Calibri Light"/>
+          <a:ea typeface="宋体" pitchFamily="2" charset="-122"/>
+        </a:defRPr>
+      </a:lvl4pPr>
+      <a:lvl5pPr algn="l" rtl="0" fontAlgn="base">
+        <a:lnSpc>
+          <a:spcPct val="90000"/>
+        </a:lnSpc>
+        <a:spcBef>
+          <a:spcPct val="0"/>
+        </a:spcBef>
+        <a:spcAft>
+          <a:spcPct val="0"/>
+        </a:spcAft>
+        <a:defRPr sz="4400">
+          <a:solidFill>
+            <a:schemeClr val="tx1"/>
+          </a:solidFill>
+          <a:latin typeface="Calibri Light"/>
+          <a:ea typeface="宋体" pitchFamily="2" charset="-122"/>
+        </a:defRPr>
+      </a:lvl5pPr>
+      <a:lvl6pPr marL="457200" algn="l" rtl="0" fontAlgn="base">
+        <a:lnSpc>
+          <a:spcPct val="90000"/>
+        </a:lnSpc>
+        <a:spcBef>
+          <a:spcPct val="0"/>
+        </a:spcBef>
+        <a:spcAft>
+          <a:spcPct val="0"/>
+        </a:spcAft>
+        <a:defRPr sz="4400">
+          <a:solidFill>
+            <a:schemeClr val="tx1"/>
+          </a:solidFill>
+          <a:latin typeface="Calibri Light"/>
+          <a:ea typeface="宋体" pitchFamily="2" charset="-122"/>
+        </a:defRPr>
+      </a:lvl6pPr>
+      <a:lvl7pPr marL="914400" algn="l" rtl="0" fontAlgn="base">
+        <a:lnSpc>
+          <a:spcPct val="90000"/>
+        </a:lnSpc>
+        <a:spcBef>
+          <a:spcPct val="0"/>
+        </a:spcBef>
+        <a:spcAft>
+          <a:spcPct val="0"/>
+        </a:spcAft>
+        <a:defRPr sz="4400">
+          <a:solidFill>
+            <a:schemeClr val="tx1"/>
+          </a:solidFill>
+          <a:latin typeface="Calibri Light"/>
+          <a:ea typeface="宋体" pitchFamily="2" charset="-122"/>
+        </a:defRPr>
+      </a:lvl7pPr>
+      <a:lvl8pPr marL="1371600" algn="l" rtl="0" fontAlgn="base">
+        <a:lnSpc>
+          <a:spcPct val="90000"/>
+        </a:lnSpc>
+        <a:spcBef>
+          <a:spcPct val="0"/>
+        </a:spcBef>
+        <a:spcAft>
+          <a:spcPct val="0"/>
+        </a:spcAft>
+        <a:defRPr sz="4400">
+          <a:solidFill>
+            <a:schemeClr val="tx1"/>
+          </a:solidFill>
+          <a:latin typeface="Calibri Light"/>
+          <a:ea typeface="宋体" pitchFamily="2" charset="-122"/>
+        </a:defRPr>
+      </a:lvl8pPr>
+      <a:lvl9pPr marL="1828800" algn="l" rtl="0" fontAlgn="base">
+        <a:lnSpc>
+          <a:spcPct val="90000"/>
+        </a:lnSpc>
+        <a:spcBef>
+          <a:spcPct val="0"/>
+        </a:spcBef>
+        <a:spcAft>
+          <a:spcPct val="0"/>
+        </a:spcAft>
+        <a:defRPr sz="4400">
+          <a:solidFill>
+            <a:schemeClr val="tx1"/>
+          </a:solidFill>
+          <a:latin typeface="Calibri Light"/>
+          <a:ea typeface="宋体" pitchFamily="2" charset="-122"/>
+        </a:defRPr>
+      </a:lvl9pPr>
     </p:titleStyle>
     <p:bodyStyle>
-      <a:lvl1pPr marL="228600" indent="-228600" algn="l" defTabSz="914400" rtl="0" eaLnBrk="1" latinLnBrk="0" hangingPunct="1">
+      <a:lvl1pPr marL="228600" indent="-228600" algn="l" rtl="0" fontAlgn="base">
         <a:lnSpc>
           <a:spcPct val="90000"/>
         </a:lnSpc>
         <a:spcBef>
           <a:spcPts val="1000"/>
         </a:spcBef>
-        <a:buFont typeface="Arial" panose="020B0604020202020204" pitchFamily="34" charset="0"/>
+        <a:spcAft>
+          <a:spcPct val="0"/>
+        </a:spcAft>
+        <a:buFont typeface="Arial" charset="0"/>
         <a:buChar char="•"/>
         <a:defRPr sz="2800" kern="1200">
           <a:solidFill>
@@ -3142,14 +3740,17 @@
           <a:cs typeface="+mn-cs"/>
         </a:defRPr>
       </a:lvl1pPr>
-      <a:lvl2pPr marL="685800" indent="-228600" algn="l" defTabSz="914400" rtl="0" eaLnBrk="1" latinLnBrk="0" hangingPunct="1">
+      <a:lvl2pPr marL="685800" indent="-228600" algn="l" rtl="0" fontAlgn="base">
         <a:lnSpc>
           <a:spcPct val="90000"/>
         </a:lnSpc>
         <a:spcBef>
           <a:spcPts val="500"/>
         </a:spcBef>
-        <a:buFont typeface="Arial" panose="020B0604020202020204" pitchFamily="34" charset="0"/>
+        <a:spcAft>
+          <a:spcPct val="0"/>
+        </a:spcAft>
+        <a:buFont typeface="Arial" charset="0"/>
         <a:buChar char="•"/>
         <a:defRPr sz="2400" kern="1200">
           <a:solidFill>
@@ -3160,14 +3761,17 @@
           <a:cs typeface="+mn-cs"/>
         </a:defRPr>
       </a:lvl2pPr>
-      <a:lvl3pPr marL="1143000" indent="-228600" algn="l" defTabSz="914400" rtl="0" eaLnBrk="1" latinLnBrk="0" hangingPunct="1">
+      <a:lvl3pPr marL="1143000" indent="-228600" algn="l" rtl="0" fontAlgn="base">
         <a:lnSpc>
           <a:spcPct val="90000"/>
         </a:lnSpc>
         <a:spcBef>
           <a:spcPts val="500"/>
         </a:spcBef>
-        <a:buFont typeface="Arial" panose="020B0604020202020204" pitchFamily="34" charset="0"/>
+        <a:spcAft>
+          <a:spcPct val="0"/>
+        </a:spcAft>
+        <a:buFont typeface="Arial" charset="0"/>
         <a:buChar char="•"/>
         <a:defRPr sz="2000" kern="1200">
           <a:solidFill>
@@ -3178,16 +3782,19 @@
           <a:cs typeface="+mn-cs"/>
         </a:defRPr>
       </a:lvl3pPr>
-      <a:lvl4pPr marL="1600200" indent="-228600" algn="l" defTabSz="914400" rtl="0" eaLnBrk="1" latinLnBrk="0" hangingPunct="1">
+      <a:lvl4pPr marL="1600200" indent="-228600" algn="l" rtl="0" fontAlgn="base">
         <a:lnSpc>
           <a:spcPct val="90000"/>
         </a:lnSpc>
         <a:spcBef>
           <a:spcPts val="500"/>
         </a:spcBef>
-        <a:buFont typeface="Arial" panose="020B0604020202020204" pitchFamily="34" charset="0"/>
+        <a:spcAft>
+          <a:spcPct val="0"/>
+        </a:spcAft>
+        <a:buFont typeface="Arial" charset="0"/>
         <a:buChar char="•"/>
-        <a:defRPr sz="1800" kern="1200">
+        <a:defRPr kern="1200">
           <a:solidFill>
             <a:schemeClr val="tx1"/>
           </a:solidFill>
@@ -3196,16 +3803,19 @@
           <a:cs typeface="+mn-cs"/>
         </a:defRPr>
       </a:lvl4pPr>
-      <a:lvl5pPr marL="2057400" indent="-228600" algn="l" defTabSz="914400" rtl="0" eaLnBrk="1" latinLnBrk="0" hangingPunct="1">
+      <a:lvl5pPr marL="2057400" indent="-228600" algn="l" rtl="0" fontAlgn="base">
         <a:lnSpc>
           <a:spcPct val="90000"/>
         </a:lnSpc>
         <a:spcBef>
           <a:spcPts val="500"/>
         </a:spcBef>
-        <a:buFont typeface="Arial" panose="020B0604020202020204" pitchFamily="34" charset="0"/>
+        <a:spcAft>
+          <a:spcPct val="0"/>
+        </a:spcAft>
+        <a:buFont typeface="Arial" charset="0"/>
         <a:buChar char="•"/>
-        <a:defRPr sz="1800" kern="1200">
+        <a:defRPr kern="1200">
           <a:solidFill>
             <a:schemeClr val="tx1"/>
           </a:solidFill>
@@ -3405,7 +4015,7 @@
       </p:grpSpPr>
       <p:sp>
         <p:nvSpPr>
-          <p:cNvPr id="2" name="标题 1"/>
+          <p:cNvPr id="14337" name="标题 1"/>
           <p:cNvSpPr>
             <a:spLocks noGrp="1"/>
           </p:cNvSpPr>
@@ -3419,16 +4029,16 @@
           <a:lstStyle/>
           <a:p>
             <a:r>
-              <a:rPr lang="en-US" altLang="zh-CN" dirty="0" smtClean="0"/>
+              <a:rPr lang="en-US" altLang="zh-CN" smtClean="0"/>
               <a:t>Driver 2015</a:t>
             </a:r>
-            <a:endParaRPr lang="zh-CN" altLang="en-US" dirty="0"/>
-          </a:p>
-        </p:txBody>
-      </p:sp>
-      <p:sp>
-        <p:nvSpPr>
-          <p:cNvPr id="3" name="副标题 2"/>
+            <a:endParaRPr lang="zh-CN" altLang="en-US" smtClean="0"/>
+          </a:p>
+        </p:txBody>
+      </p:sp>
+      <p:sp>
+        <p:nvSpPr>
+          <p:cNvPr id="14338" name="副标题 2"/>
           <p:cNvSpPr>
             <a:spLocks noGrp="1"/>
           </p:cNvSpPr>
@@ -3442,23 +4052,14 @@
           <a:lstStyle/>
           <a:p>
             <a:r>
-              <a:rPr lang="en-US" altLang="zh-CN" dirty="0" smtClean="0"/>
-              <a:t>Kernel for </a:t>
-            </a:r>
-            <a:r>
-              <a:rPr lang="en-US" altLang="zh-CN" dirty="0" err="1" smtClean="0"/>
-              <a:t>Pricision</a:t>
-            </a:r>
-            <a:endParaRPr lang="zh-CN" altLang="en-US" dirty="0"/>
+              <a:rPr lang="en-US" altLang="zh-CN" smtClean="0"/>
+              <a:t>Kernel for Precision</a:t>
+            </a:r>
+            <a:endParaRPr lang="zh-CN" altLang="en-US" smtClean="0"/>
           </a:p>
         </p:txBody>
       </p:sp>
     </p:spTree>
-    <p:extLst>
-      <p:ext uri="{BB962C8B-B14F-4D97-AF65-F5344CB8AC3E}">
-        <p14:creationId xmlns:p14="http://schemas.microsoft.com/office/powerpoint/2010/main" val="531994833"/>
-      </p:ext>
-    </p:extLst>
   </p:cSld>
   <p:clrMapOvr>
     <a:masterClrMapping/>
@@ -3492,7 +4093,7 @@
       </p:grpSpPr>
       <p:sp>
         <p:nvSpPr>
-          <p:cNvPr id="2" name="标题 1"/>
+          <p:cNvPr id="15361" name="标题 1"/>
           <p:cNvSpPr>
             <a:spLocks noGrp="1"/>
           </p:cNvSpPr>
@@ -3507,16 +4108,16 @@
           <a:p>
             <a:pPr algn="ctr"/>
             <a:r>
-              <a:rPr lang="en-US" altLang="zh-CN" dirty="0" smtClean="0"/>
+              <a:rPr lang="en-US" altLang="zh-CN" smtClean="0"/>
               <a:t>RTOS</a:t>
             </a:r>
-            <a:endParaRPr lang="zh-CN" altLang="en-US" dirty="0"/>
+            <a:endParaRPr lang="zh-CN" altLang="en-US" smtClean="0"/>
           </a:p>
         </p:txBody>
       </p:sp>
       <p:pic>
         <p:nvPicPr>
-          <p:cNvPr id="1026" name="Picture 2" descr="http://www.freertos.org/logo.jpg"/>
+          <p:cNvPr id="15362" name="Picture 2" descr="http://www.freertos.org/logo.jpg"/>
           <p:cNvPicPr>
             <a:picLocks noGrp="1" noChangeAspect="1" noChangeArrowheads="1"/>
           </p:cNvPicPr>
@@ -3525,13 +4126,71 @@
           </p:nvPr>
         </p:nvPicPr>
         <p:blipFill>
-          <a:blip r:embed="rId3">
-            <a:extLst>
-              <a:ext uri="{28A0092B-C50C-407E-A947-70E740481C1C}">
-                <a14:useLocalDpi xmlns:a14="http://schemas.microsoft.com/office/drawing/2010/main" val="0"/>
-              </a:ext>
-            </a:extLst>
-          </a:blip>
+          <a:blip r:embed="rId3"/>
+          <a:srcRect/>
+          <a:stretch>
+            <a:fillRect/>
+          </a:stretch>
+        </p:blipFill>
+        <p:spPr>
+          <a:xfrm>
+            <a:off x="660400" y="1946275"/>
+            <a:ext cx="3933825" cy="1495425"/>
+          </a:xfrm>
+        </p:spPr>
+      </p:pic>
+      <p:sp>
+        <p:nvSpPr>
+          <p:cNvPr id="15363" name="文本框 3"/>
+          <p:cNvSpPr txBox="1">
+            <a:spLocks noChangeArrowheads="1"/>
+          </p:cNvSpPr>
+          <p:nvPr/>
+        </p:nvSpPr>
+        <p:spPr bwMode="auto">
+          <a:xfrm>
+            <a:off x="5118100" y="3706813"/>
+            <a:ext cx="1270000" cy="585787"/>
+          </a:xfrm>
+          <a:prstGeom prst="rect">
+            <a:avLst/>
+          </a:prstGeom>
+          <a:noFill/>
+          <a:ln w="9525">
+            <a:noFill/>
+            <a:miter lim="800000"/>
+            <a:headEnd/>
+            <a:tailEnd/>
+          </a:ln>
+        </p:spPr>
+        <p:txBody>
+          <a:bodyPr wrap="none">
+            <a:spAutoFit/>
+          </a:bodyPr>
+          <a:lstStyle/>
+          <a:p>
+            <a:r>
+              <a:rPr lang="en-US" altLang="zh-CN" sz="3200" b="1">
+                <a:latin typeface="Calibri" pitchFamily="34" charset="0"/>
+              </a:rPr>
+              <a:t>V8.2.0</a:t>
+            </a:r>
+            <a:endParaRPr lang="zh-CN" altLang="en-US" sz="3200" b="1">
+              <a:latin typeface="Calibri" pitchFamily="34" charset="0"/>
+            </a:endParaRPr>
+          </a:p>
+        </p:txBody>
+      </p:sp>
+      <p:pic>
+        <p:nvPicPr>
+          <p:cNvPr id="15364" name="图片 4"/>
+          <p:cNvPicPr>
+            <a:picLocks noChangeAspect="1"/>
+          </p:cNvPicPr>
+          <p:nvPr/>
+        </p:nvPicPr>
+        <p:blipFill>
+          <a:blip r:embed="rId4"/>
           <a:srcRect/>
           <a:stretch>
             <a:fillRect/>
@@ -3539,150 +4198,80 @@
         </p:blipFill>
         <p:spPr bwMode="auto">
           <a:xfrm>
-            <a:off x="660786" y="1946223"/>
-            <a:ext cx="3933825" cy="1495425"/>
+            <a:off x="6735763" y="1247775"/>
+            <a:ext cx="5181600" cy="5610225"/>
           </a:xfrm>
           <a:prstGeom prst="rect">
             <a:avLst/>
           </a:prstGeom>
           <a:noFill/>
-          <a:extLst>
-            <a:ext uri="{909E8E84-426E-40DD-AFC4-6F175D3DCCD1}">
-              <a14:hiddenFill xmlns:a14="http://schemas.microsoft.com/office/drawing/2010/main">
-                <a:solidFill>
-                  <a:srgbClr val="FFFFFF"/>
-                </a:solidFill>
-              </a14:hiddenFill>
-            </a:ext>
-          </a:extLst>
+          <a:ln w="9525">
+            <a:noFill/>
+            <a:miter lim="800000"/>
+            <a:headEnd/>
+            <a:tailEnd/>
+          </a:ln>
         </p:spPr>
       </p:pic>
       <p:sp>
         <p:nvSpPr>
-          <p:cNvPr id="4" name="文本框 3"/>
-          <p:cNvSpPr txBox="1"/>
+          <p:cNvPr id="15365" name="文本框 5"/>
+          <p:cNvSpPr txBox="1">
+            <a:spLocks noChangeArrowheads="1"/>
+          </p:cNvSpPr>
           <p:nvPr/>
         </p:nvSpPr>
-        <p:spPr>
+        <p:spPr bwMode="auto">
           <a:xfrm>
-            <a:off x="5117410" y="3707178"/>
-            <a:ext cx="1269899" cy="584775"/>
+            <a:off x="639763" y="4270375"/>
+            <a:ext cx="6096000" cy="2586038"/>
           </a:xfrm>
           <a:prstGeom prst="rect">
             <a:avLst/>
           </a:prstGeom>
           <a:noFill/>
+          <a:ln w="9525">
+            <a:noFill/>
+            <a:miter lim="800000"/>
+            <a:headEnd/>
+            <a:tailEnd/>
+          </a:ln>
         </p:spPr>
         <p:txBody>
-          <a:bodyPr wrap="none" rtlCol="0">
+          <a:bodyPr>
             <a:spAutoFit/>
           </a:bodyPr>
           <a:lstStyle/>
           <a:p>
             <a:r>
-              <a:rPr lang="en-US" altLang="zh-CN" sz="3200" b="1" dirty="0" smtClean="0"/>
-              <a:t>V8.2.0</a:t>
-            </a:r>
-            <a:endParaRPr lang="zh-CN" altLang="en-US" sz="3200" b="1" dirty="0"/>
-          </a:p>
-        </p:txBody>
-      </p:sp>
-      <p:pic>
-        <p:nvPicPr>
-          <p:cNvPr id="5" name="图片 4"/>
-          <p:cNvPicPr>
-            <a:picLocks noChangeAspect="1"/>
-          </p:cNvPicPr>
-          <p:nvPr/>
-        </p:nvPicPr>
-        <p:blipFill>
-          <a:blip r:embed="rId4"/>
-          <a:stretch>
-            <a:fillRect/>
-          </a:stretch>
-        </p:blipFill>
-        <p:spPr>
-          <a:xfrm>
-            <a:off x="6735737" y="1247775"/>
-            <a:ext cx="5181600" cy="5610225"/>
-          </a:xfrm>
-          <a:prstGeom prst="rect">
-            <a:avLst/>
-          </a:prstGeom>
-        </p:spPr>
-      </p:pic>
-      <p:sp>
-        <p:nvSpPr>
-          <p:cNvPr id="6" name="文本框 5"/>
-          <p:cNvSpPr txBox="1"/>
-          <p:nvPr/>
-        </p:nvSpPr>
-        <p:spPr>
-          <a:xfrm>
-            <a:off x="639737" y="4270721"/>
-            <a:ext cx="6096000" cy="2585323"/>
-          </a:xfrm>
-          <a:prstGeom prst="rect">
-            <a:avLst/>
-          </a:prstGeom>
-          <a:noFill/>
-        </p:spPr>
-        <p:txBody>
-          <a:bodyPr wrap="square" rtlCol="0">
-            <a:spAutoFit/>
-          </a:bodyPr>
-          <a:lstStyle/>
-          <a:p>
-            <a:r>
-              <a:rPr lang="en-US" altLang="zh-CN" b="1" dirty="0"/>
-              <a:t>Why choose </a:t>
-            </a:r>
-            <a:r>
-              <a:rPr lang="en-US" altLang="zh-CN" b="1" dirty="0" err="1"/>
-              <a:t>FreeRTOS</a:t>
-            </a:r>
-            <a:r>
-              <a:rPr lang="en-US" altLang="zh-CN" b="1" dirty="0"/>
-              <a:t>?</a:t>
-            </a:r>
-          </a:p>
-          <a:p>
-            <a:r>
-              <a:rPr lang="en-US" altLang="zh-CN" i="1" dirty="0"/>
-              <a:t>"It's probably safe to say at this point that </a:t>
-            </a:r>
-            <a:r>
-              <a:rPr lang="en-US" altLang="zh-CN" i="1" dirty="0" err="1"/>
-              <a:t>FreeRTOS</a:t>
-            </a:r>
-            <a:r>
-              <a:rPr lang="en-US" altLang="zh-CN" i="1" dirty="0"/>
-              <a:t> goes through more 'peer-review' than any other RTOS available on the planet. I have used it in several projects - one of which was a multiprocessor environment that used more than 64 processors and needed to run for months reliably. The RTOS core performed well. Take </a:t>
-            </a:r>
-            <a:r>
-              <a:rPr lang="en-US" altLang="zh-CN" i="1" dirty="0" err="1"/>
-              <a:t>FreeRTOS</a:t>
-            </a:r>
-            <a:r>
-              <a:rPr lang="en-US" altLang="zh-CN" i="1" dirty="0"/>
-              <a:t> for a spin."</a:t>
-            </a:r>
-            <a:r>
-              <a:rPr lang="en-US" altLang="zh-CN" dirty="0"/>
+              <a:rPr lang="en-US" altLang="zh-CN" b="1">
+                <a:latin typeface="Calibri" pitchFamily="34" charset="0"/>
+              </a:rPr>
+              <a:t>Why choose FreeRTOS?</a:t>
+            </a:r>
+          </a:p>
+          <a:p>
+            <a:r>
+              <a:rPr lang="en-US" altLang="zh-CN" i="1">
+                <a:latin typeface="Calibri" pitchFamily="34" charset="0"/>
+              </a:rPr>
+              <a:t>"It's probably safe to say at this point that FreeRTOS goes through more 'peer-review' than any other RTOS available on the planet. I have used it in several projects - one of which was a multiprocessor environment that used more than 64 processors and needed to run for months reliably. The RTOS core performed well. Take FreeRTOS for a spin."</a:t>
+            </a:r>
+            <a:r>
+              <a:rPr lang="en-US" altLang="zh-CN">
+                <a:latin typeface="Calibri" pitchFamily="34" charset="0"/>
+              </a:rPr>
               <a:t> - John Westmoreland </a:t>
             </a:r>
           </a:p>
           <a:p>
-            <a:endParaRPr lang="zh-CN" altLang="en-US" dirty="0"/>
+            <a:endParaRPr lang="zh-CN" altLang="en-US">
+              <a:latin typeface="Calibri" pitchFamily="34" charset="0"/>
+            </a:endParaRPr>
           </a:p>
         </p:txBody>
       </p:sp>
     </p:spTree>
-    <p:extLst>
-      <p:ext uri="{BB962C8B-B14F-4D97-AF65-F5344CB8AC3E}">
-        <p14:creationId xmlns:p14="http://schemas.microsoft.com/office/powerpoint/2010/main" val="1189335489"/>
-      </p:ext>
-    </p:extLst>
   </p:cSld>
   <p:clrMapOvr>
     <a:masterClrMapping/>
@@ -3716,7 +4305,7 @@
       </p:grpSpPr>
       <p:sp>
         <p:nvSpPr>
-          <p:cNvPr id="2" name="标题 1"/>
+          <p:cNvPr id="17409" name="标题 1"/>
           <p:cNvSpPr>
             <a:spLocks noGrp="1"/>
           </p:cNvSpPr>
@@ -3729,13 +4318,13 @@
           <a:bodyPr/>
           <a:lstStyle/>
           <a:p>
-            <a:endParaRPr lang="zh-CN" altLang="en-US"/>
-          </a:p>
-        </p:txBody>
-      </p:sp>
-      <p:sp>
-        <p:nvSpPr>
-          <p:cNvPr id="3" name="内容占位符 2"/>
+            <a:endParaRPr lang="en-US" altLang="zh-CN" smtClean="0"/>
+          </a:p>
+        </p:txBody>
+      </p:sp>
+      <p:sp>
+        <p:nvSpPr>
+          <p:cNvPr id="17410" name="内容占位符 2"/>
           <p:cNvSpPr>
             <a:spLocks noGrp="1"/>
           </p:cNvSpPr>
@@ -3748,20 +4337,22 @@
           <a:bodyPr/>
           <a:lstStyle/>
           <a:p>
-            <a:endParaRPr lang="zh-CN" altLang="en-US"/>
+            <a:endParaRPr lang="zh-CN" altLang="en-US" smtClean="0"/>
           </a:p>
         </p:txBody>
       </p:sp>
     </p:spTree>
-    <p:extLst>
-      <p:ext uri="{BB962C8B-B14F-4D97-AF65-F5344CB8AC3E}">
-        <p14:creationId xmlns:p14="http://schemas.microsoft.com/office/powerpoint/2010/main" val="3536413871"/>
-      </p:ext>
-    </p:extLst>
   </p:cSld>
   <p:clrMapOvr>
     <a:masterClrMapping/>
   </p:clrMapOvr>
+  <p:timing>
+    <p:tnLst>
+      <p:par>
+        <p:cTn id="1" dur="indefinite" restart="never" nodeType="tmRoot"/>
+      </p:par>
+    </p:tnLst>
+  </p:timing>
 </p:sld>
 </file>
 
@@ -3808,7 +4399,7 @@
     </a:clrScheme>
     <a:fontScheme name="Office">
       <a:majorFont>
-        <a:latin typeface="Calibri Light" panose="020F0302020204030204"/>
+        <a:latin typeface="Calibri Light"/>
         <a:ea typeface=""/>
         <a:cs typeface=""/>
         <a:font script="Jpan" typeface="ＭＳ Ｐゴシック"/>
@@ -3843,7 +4434,7 @@
         <a:font script="Geor" typeface="Sylfaen"/>
       </a:majorFont>
       <a:minorFont>
-        <a:latin typeface="Calibri" panose="020F0502020204030204"/>
+        <a:latin typeface="Calibri"/>
         <a:ea typeface=""/>
         <a:cs typeface=""/>
         <a:font script="Jpan" typeface="ＭＳ Ｐゴシック"/>
@@ -4020,7 +4611,7 @@
   <a:extraClrSchemeLst/>
   <a:extLst>
     <a:ext uri="{05A4C25C-085E-4340-85A3-A5531E510DB2}">
-      <thm15:themeFamily xmlns:thm15="http://schemas.microsoft.com/office/thememl/2012/main" name="Office Theme" id="{62F939B6-93AF-4DB8-9C6B-D6C7DFDC589F}" vid="{4A3C46E8-61CC-4603-A589-7422A47A8E4A}"/>
+      <thm15:themeFamily xmlns="" xmlns:thm15="http://schemas.microsoft.com/office/thememl/2012/main" name="Office Theme" id="{62F939B6-93AF-4DB8-9C6B-D6C7DFDC589F}" vid="{4A3C46E8-61CC-4603-A589-7422A47A8E4A}"/>
     </a:ext>
   </a:extLst>
 </a:theme>
@@ -4069,7 +4660,7 @@
     </a:clrScheme>
     <a:fontScheme name="Office">
       <a:majorFont>
-        <a:latin typeface="Calibri Light" panose="020F0302020204030204"/>
+        <a:latin typeface="Calibri Light"/>
         <a:ea typeface=""/>
         <a:cs typeface=""/>
         <a:font script="Jpan" typeface="ＭＳ Ｐゴシック"/>
@@ -4104,7 +4695,7 @@
         <a:font script="Geor" typeface="Sylfaen"/>
       </a:majorFont>
       <a:minorFont>
-        <a:latin typeface="Calibri" panose="020F0502020204030204"/>
+        <a:latin typeface="Calibri"/>
         <a:ea typeface=""/>
         <a:cs typeface=""/>
         <a:font script="Jpan" typeface="ＭＳ Ｐゴシック"/>
@@ -4281,7 +4872,7 @@
   <a:extraClrSchemeLst/>
   <a:extLst>
     <a:ext uri="{05A4C25C-085E-4340-85A3-A5531E510DB2}">
-      <thm15:themeFamily xmlns:thm15="http://schemas.microsoft.com/office/thememl/2012/main" name="Office Theme" id="{62F939B6-93AF-4DB8-9C6B-D6C7DFDC589F}" vid="{4A3C46E8-61CC-4603-A589-7422A47A8E4A}"/>
+      <thm15:themeFamily xmlns="" xmlns:thm15="http://schemas.microsoft.com/office/thememl/2012/main" name="Office Theme" id="{62F939B6-93AF-4DB8-9C6B-D6C7DFDC589F}" vid="{4A3C46E8-61CC-4603-A589-7422A47A8E4A}"/>
     </a:ext>
   </a:extLst>
 </a:theme>

</xml_diff>